<commit_message>
Updates to Lesson 5 slideshows
</commit_message>
<xml_diff>
--- a/sk/day-05/Day-05-Slide-Deck.pptx
+++ b/sk/day-05/Day-05-Slide-Deck.pptx
@@ -5,7 +5,7 @@
     <p:sldMasterId id="2147483660" r:id="rId1"/>
   </p:sldMasterIdLst>
   <p:notesMasterIdLst>
-    <p:notesMasterId r:id="rId31"/>
+    <p:notesMasterId r:id="rId39"/>
   </p:notesMasterIdLst>
   <p:sldIdLst>
     <p:sldId id="256" r:id="rId2"/>
@@ -15,28 +15,36 @@
     <p:sldId id="322" r:id="rId6"/>
     <p:sldId id="307" r:id="rId7"/>
     <p:sldId id="303" r:id="rId8"/>
-    <p:sldId id="308" r:id="rId9"/>
-    <p:sldId id="301" r:id="rId10"/>
-    <p:sldId id="309" r:id="rId11"/>
-    <p:sldId id="302" r:id="rId12"/>
-    <p:sldId id="310" r:id="rId13"/>
-    <p:sldId id="304" r:id="rId14"/>
-    <p:sldId id="323" r:id="rId15"/>
-    <p:sldId id="324" r:id="rId16"/>
-    <p:sldId id="325" r:id="rId17"/>
-    <p:sldId id="326" r:id="rId18"/>
-    <p:sldId id="332" r:id="rId19"/>
-    <p:sldId id="331" r:id="rId20"/>
-    <p:sldId id="327" r:id="rId21"/>
-    <p:sldId id="328" r:id="rId22"/>
-    <p:sldId id="333" r:id="rId23"/>
-    <p:sldId id="329" r:id="rId24"/>
-    <p:sldId id="330" r:id="rId25"/>
-    <p:sldId id="311" r:id="rId26"/>
-    <p:sldId id="305" r:id="rId27"/>
-    <p:sldId id="295" r:id="rId28"/>
-    <p:sldId id="258" r:id="rId29"/>
-    <p:sldId id="281" r:id="rId30"/>
+    <p:sldId id="334" r:id="rId9"/>
+    <p:sldId id="335" r:id="rId10"/>
+    <p:sldId id="336" r:id="rId11"/>
+    <p:sldId id="337" r:id="rId12"/>
+    <p:sldId id="338" r:id="rId13"/>
+    <p:sldId id="339" r:id="rId14"/>
+    <p:sldId id="340" r:id="rId15"/>
+    <p:sldId id="341" r:id="rId16"/>
+    <p:sldId id="308" r:id="rId17"/>
+    <p:sldId id="301" r:id="rId18"/>
+    <p:sldId id="309" r:id="rId19"/>
+    <p:sldId id="302" r:id="rId20"/>
+    <p:sldId id="310" r:id="rId21"/>
+    <p:sldId id="304" r:id="rId22"/>
+    <p:sldId id="323" r:id="rId23"/>
+    <p:sldId id="324" r:id="rId24"/>
+    <p:sldId id="325" r:id="rId25"/>
+    <p:sldId id="326" r:id="rId26"/>
+    <p:sldId id="332" r:id="rId27"/>
+    <p:sldId id="331" r:id="rId28"/>
+    <p:sldId id="327" r:id="rId29"/>
+    <p:sldId id="328" r:id="rId30"/>
+    <p:sldId id="333" r:id="rId31"/>
+    <p:sldId id="329" r:id="rId32"/>
+    <p:sldId id="330" r:id="rId33"/>
+    <p:sldId id="311" r:id="rId34"/>
+    <p:sldId id="305" r:id="rId35"/>
+    <p:sldId id="295" r:id="rId36"/>
+    <p:sldId id="258" r:id="rId37"/>
+    <p:sldId id="281" r:id="rId38"/>
   </p:sldIdLst>
   <p:sldSz cx="12192000" cy="6858000"/>
   <p:notesSz cx="6858000" cy="9144000"/>
@@ -225,7 +233,7 @@
           <a:p>
             <a:fld id="{B83411B5-A9B8-6D4E-A83B-91456309AD37}" type="datetimeFigureOut">
               <a:rPr lang="en-US" smtClean="0"/>
-              <a:t>1/22/26</a:t>
+              <a:t>1/24/26</a:t>
             </a:fld>
             <a:endParaRPr lang="en-US"/>
           </a:p>
@@ -608,6 +616,438 @@
         <p:cNvPr id="1" name="">
           <a:extLst>
             <a:ext uri="{FF2B5EF4-FFF2-40B4-BE49-F238E27FC236}">
+              <a16:creationId xmlns:a16="http://schemas.microsoft.com/office/drawing/2014/main" id="{B8C1EE06-EC41-2887-B8ED-376F549D263D}"/>
+            </a:ext>
+          </a:extLst>
+        </p:cNvPr>
+        <p:cNvGrpSpPr/>
+        <p:nvPr/>
+      </p:nvGrpSpPr>
+      <p:grpSpPr>
+        <a:xfrm>
+          <a:off x="0" y="0"/>
+          <a:ext cx="0" cy="0"/>
+          <a:chOff x="0" y="0"/>
+          <a:chExt cx="0" cy="0"/>
+        </a:xfrm>
+      </p:grpSpPr>
+      <p:sp>
+        <p:nvSpPr>
+          <p:cNvPr id="2" name="Slide Image Placeholder 1">
+            <a:extLst>
+              <a:ext uri="{FF2B5EF4-FFF2-40B4-BE49-F238E27FC236}">
+                <a16:creationId xmlns:a16="http://schemas.microsoft.com/office/drawing/2014/main" id="{4E45B921-CA69-E45C-3AD2-5213B2EEE070}"/>
+              </a:ext>
+            </a:extLst>
+          </p:cNvPr>
+          <p:cNvSpPr>
+            <a:spLocks noGrp="1" noRot="1" noChangeAspect="1"/>
+          </p:cNvSpPr>
+          <p:nvPr>
+            <p:ph type="sldImg"/>
+          </p:nvPr>
+        </p:nvSpPr>
+        <p:spPr/>
+      </p:sp>
+      <p:sp>
+        <p:nvSpPr>
+          <p:cNvPr id="3" name="Notes Placeholder 2">
+            <a:extLst>
+              <a:ext uri="{FF2B5EF4-FFF2-40B4-BE49-F238E27FC236}">
+                <a16:creationId xmlns:a16="http://schemas.microsoft.com/office/drawing/2014/main" id="{B2CB9419-CAC7-64D7-6265-A9D5A30EF369}"/>
+              </a:ext>
+            </a:extLst>
+          </p:cNvPr>
+          <p:cNvSpPr>
+            <a:spLocks noGrp="1"/>
+          </p:cNvSpPr>
+          <p:nvPr>
+            <p:ph type="body" idx="1"/>
+          </p:nvPr>
+        </p:nvSpPr>
+        <p:spPr/>
+        <p:txBody>
+          <a:bodyPr/>
+          <a:lstStyle/>
+          <a:p>
+            <a:endParaRPr lang="en-CA" dirty="0"/>
+          </a:p>
+        </p:txBody>
+      </p:sp>
+      <p:sp>
+        <p:nvSpPr>
+          <p:cNvPr id="4" name="Slide Number Placeholder 3">
+            <a:extLst>
+              <a:ext uri="{FF2B5EF4-FFF2-40B4-BE49-F238E27FC236}">
+                <a16:creationId xmlns:a16="http://schemas.microsoft.com/office/drawing/2014/main" id="{403764FC-9DDD-7E08-4052-EF94133CF82A}"/>
+              </a:ext>
+            </a:extLst>
+          </p:cNvPr>
+          <p:cNvSpPr>
+            <a:spLocks noGrp="1"/>
+          </p:cNvSpPr>
+          <p:nvPr>
+            <p:ph type="sldNum" sz="quarter" idx="5"/>
+          </p:nvPr>
+        </p:nvSpPr>
+        <p:spPr/>
+        <p:txBody>
+          <a:bodyPr/>
+          <a:lstStyle/>
+          <a:p>
+            <a:fld id="{CFE641A9-FDE3-4583-B812-65C4064188F6}" type="slidenum">
+              <a:rPr lang="en-CA" smtClean="0"/>
+              <a:t>22</a:t>
+            </a:fld>
+            <a:endParaRPr lang="en-CA"/>
+          </a:p>
+        </p:txBody>
+      </p:sp>
+    </p:spTree>
+    <p:extLst>
+      <p:ext uri="{BB962C8B-B14F-4D97-AF65-F5344CB8AC3E}">
+        <p14:creationId xmlns:p14="http://schemas.microsoft.com/office/powerpoint/2010/main" val="3075397985"/>
+      </p:ext>
+    </p:extLst>
+  </p:cSld>
+  <p:clrMapOvr>
+    <a:masterClrMapping/>
+  </p:clrMapOvr>
+</p:notes>
+</file>
+
+<file path=ppt/notesSlides/notesSlide11.xml><?xml version="1.0" encoding="utf-8"?>
+<p:notes xmlns:a="http://schemas.openxmlformats.org/drawingml/2006/main" xmlns:r="http://schemas.openxmlformats.org/officeDocument/2006/relationships" xmlns:p="http://schemas.openxmlformats.org/presentationml/2006/main">
+  <p:cSld>
+    <p:spTree>
+      <p:nvGrpSpPr>
+        <p:cNvPr id="1" name="">
+          <a:extLst>
+            <a:ext uri="{FF2B5EF4-FFF2-40B4-BE49-F238E27FC236}">
+              <a16:creationId xmlns:a16="http://schemas.microsoft.com/office/drawing/2014/main" id="{85D5AD3C-FADE-36D0-9862-EB1163B148E9}"/>
+            </a:ext>
+          </a:extLst>
+        </p:cNvPr>
+        <p:cNvGrpSpPr/>
+        <p:nvPr/>
+      </p:nvGrpSpPr>
+      <p:grpSpPr>
+        <a:xfrm>
+          <a:off x="0" y="0"/>
+          <a:ext cx="0" cy="0"/>
+          <a:chOff x="0" y="0"/>
+          <a:chExt cx="0" cy="0"/>
+        </a:xfrm>
+      </p:grpSpPr>
+      <p:sp>
+        <p:nvSpPr>
+          <p:cNvPr id="2" name="Slide Image Placeholder 1">
+            <a:extLst>
+              <a:ext uri="{FF2B5EF4-FFF2-40B4-BE49-F238E27FC236}">
+                <a16:creationId xmlns:a16="http://schemas.microsoft.com/office/drawing/2014/main" id="{20D1821E-663C-E0C1-64B7-8D2AAAD4D4CA}"/>
+              </a:ext>
+            </a:extLst>
+          </p:cNvPr>
+          <p:cNvSpPr>
+            <a:spLocks noGrp="1" noRot="1" noChangeAspect="1"/>
+          </p:cNvSpPr>
+          <p:nvPr>
+            <p:ph type="sldImg"/>
+          </p:nvPr>
+        </p:nvSpPr>
+        <p:spPr/>
+      </p:sp>
+      <p:sp>
+        <p:nvSpPr>
+          <p:cNvPr id="3" name="Notes Placeholder 2">
+            <a:extLst>
+              <a:ext uri="{FF2B5EF4-FFF2-40B4-BE49-F238E27FC236}">
+                <a16:creationId xmlns:a16="http://schemas.microsoft.com/office/drawing/2014/main" id="{E4ADF94A-11EC-BA07-6F22-BA7642B949D7}"/>
+              </a:ext>
+            </a:extLst>
+          </p:cNvPr>
+          <p:cNvSpPr>
+            <a:spLocks noGrp="1"/>
+          </p:cNvSpPr>
+          <p:nvPr>
+            <p:ph type="body" idx="1"/>
+          </p:nvPr>
+        </p:nvSpPr>
+        <p:spPr/>
+        <p:txBody>
+          <a:bodyPr/>
+          <a:lstStyle/>
+          <a:p>
+            <a:endParaRPr lang="en-CA" dirty="0"/>
+          </a:p>
+        </p:txBody>
+      </p:sp>
+      <p:sp>
+        <p:nvSpPr>
+          <p:cNvPr id="4" name="Slide Number Placeholder 3">
+            <a:extLst>
+              <a:ext uri="{FF2B5EF4-FFF2-40B4-BE49-F238E27FC236}">
+                <a16:creationId xmlns:a16="http://schemas.microsoft.com/office/drawing/2014/main" id="{BB0ACBB5-5674-97AD-0CB0-5451BC677F01}"/>
+              </a:ext>
+            </a:extLst>
+          </p:cNvPr>
+          <p:cNvSpPr>
+            <a:spLocks noGrp="1"/>
+          </p:cNvSpPr>
+          <p:nvPr>
+            <p:ph type="sldNum" sz="quarter" idx="5"/>
+          </p:nvPr>
+        </p:nvSpPr>
+        <p:spPr/>
+        <p:txBody>
+          <a:bodyPr/>
+          <a:lstStyle/>
+          <a:p>
+            <a:fld id="{CFE641A9-FDE3-4583-B812-65C4064188F6}" type="slidenum">
+              <a:rPr lang="en-CA" smtClean="0"/>
+              <a:t>24</a:t>
+            </a:fld>
+            <a:endParaRPr lang="en-CA"/>
+          </a:p>
+        </p:txBody>
+      </p:sp>
+    </p:spTree>
+    <p:extLst>
+      <p:ext uri="{BB962C8B-B14F-4D97-AF65-F5344CB8AC3E}">
+        <p14:creationId xmlns:p14="http://schemas.microsoft.com/office/powerpoint/2010/main" val="3739509123"/>
+      </p:ext>
+    </p:extLst>
+  </p:cSld>
+  <p:clrMapOvr>
+    <a:masterClrMapping/>
+  </p:clrMapOvr>
+</p:notes>
+</file>
+
+<file path=ppt/notesSlides/notesSlide12.xml><?xml version="1.0" encoding="utf-8"?>
+<p:notes xmlns:a="http://schemas.openxmlformats.org/drawingml/2006/main" xmlns:r="http://schemas.openxmlformats.org/officeDocument/2006/relationships" xmlns:p="http://schemas.openxmlformats.org/presentationml/2006/main">
+  <p:cSld>
+    <p:spTree>
+      <p:nvGrpSpPr>
+        <p:cNvPr id="1" name="">
+          <a:extLst>
+            <a:ext uri="{FF2B5EF4-FFF2-40B4-BE49-F238E27FC236}">
+              <a16:creationId xmlns:a16="http://schemas.microsoft.com/office/drawing/2014/main" id="{A11A95FE-028A-44DE-35F6-B39A8E93C2B5}"/>
+            </a:ext>
+          </a:extLst>
+        </p:cNvPr>
+        <p:cNvGrpSpPr/>
+        <p:nvPr/>
+      </p:nvGrpSpPr>
+      <p:grpSpPr>
+        <a:xfrm>
+          <a:off x="0" y="0"/>
+          <a:ext cx="0" cy="0"/>
+          <a:chOff x="0" y="0"/>
+          <a:chExt cx="0" cy="0"/>
+        </a:xfrm>
+      </p:grpSpPr>
+      <p:sp>
+        <p:nvSpPr>
+          <p:cNvPr id="2" name="Slide Image Placeholder 1">
+            <a:extLst>
+              <a:ext uri="{FF2B5EF4-FFF2-40B4-BE49-F238E27FC236}">
+                <a16:creationId xmlns:a16="http://schemas.microsoft.com/office/drawing/2014/main" id="{C31FD383-7670-3BEA-08AD-9FB7AB43C31B}"/>
+              </a:ext>
+            </a:extLst>
+          </p:cNvPr>
+          <p:cNvSpPr>
+            <a:spLocks noGrp="1" noRot="1" noChangeAspect="1"/>
+          </p:cNvSpPr>
+          <p:nvPr>
+            <p:ph type="sldImg"/>
+          </p:nvPr>
+        </p:nvSpPr>
+        <p:spPr/>
+      </p:sp>
+      <p:sp>
+        <p:nvSpPr>
+          <p:cNvPr id="3" name="Notes Placeholder 2">
+            <a:extLst>
+              <a:ext uri="{FF2B5EF4-FFF2-40B4-BE49-F238E27FC236}">
+                <a16:creationId xmlns:a16="http://schemas.microsoft.com/office/drawing/2014/main" id="{A97ECF45-17CA-AC2D-D210-3D0C3375B16E}"/>
+              </a:ext>
+            </a:extLst>
+          </p:cNvPr>
+          <p:cNvSpPr>
+            <a:spLocks noGrp="1"/>
+          </p:cNvSpPr>
+          <p:nvPr>
+            <p:ph type="body" idx="1"/>
+          </p:nvPr>
+        </p:nvSpPr>
+        <p:spPr/>
+        <p:txBody>
+          <a:bodyPr/>
+          <a:lstStyle/>
+          <a:p>
+            <a:endParaRPr lang="en-CA" dirty="0"/>
+          </a:p>
+        </p:txBody>
+      </p:sp>
+      <p:sp>
+        <p:nvSpPr>
+          <p:cNvPr id="4" name="Slide Number Placeholder 3">
+            <a:extLst>
+              <a:ext uri="{FF2B5EF4-FFF2-40B4-BE49-F238E27FC236}">
+                <a16:creationId xmlns:a16="http://schemas.microsoft.com/office/drawing/2014/main" id="{94E832F1-6778-3FAA-BE7D-E4E57A6F01F5}"/>
+              </a:ext>
+            </a:extLst>
+          </p:cNvPr>
+          <p:cNvSpPr>
+            <a:spLocks noGrp="1"/>
+          </p:cNvSpPr>
+          <p:nvPr>
+            <p:ph type="sldNum" sz="quarter" idx="5"/>
+          </p:nvPr>
+        </p:nvSpPr>
+        <p:spPr/>
+        <p:txBody>
+          <a:bodyPr/>
+          <a:lstStyle/>
+          <a:p>
+            <a:fld id="{CFE641A9-FDE3-4583-B812-65C4064188F6}" type="slidenum">
+              <a:rPr lang="en-CA" smtClean="0"/>
+              <a:t>26</a:t>
+            </a:fld>
+            <a:endParaRPr lang="en-CA"/>
+          </a:p>
+        </p:txBody>
+      </p:sp>
+    </p:spTree>
+    <p:extLst>
+      <p:ext uri="{BB962C8B-B14F-4D97-AF65-F5344CB8AC3E}">
+        <p14:creationId xmlns:p14="http://schemas.microsoft.com/office/powerpoint/2010/main" val="3230157461"/>
+      </p:ext>
+    </p:extLst>
+  </p:cSld>
+  <p:clrMapOvr>
+    <a:masterClrMapping/>
+  </p:clrMapOvr>
+</p:notes>
+</file>
+
+<file path=ppt/notesSlides/notesSlide13.xml><?xml version="1.0" encoding="utf-8"?>
+<p:notes xmlns:a="http://schemas.openxmlformats.org/drawingml/2006/main" xmlns:r="http://schemas.openxmlformats.org/officeDocument/2006/relationships" xmlns:p="http://schemas.openxmlformats.org/presentationml/2006/main">
+  <p:cSld>
+    <p:spTree>
+      <p:nvGrpSpPr>
+        <p:cNvPr id="1" name="">
+          <a:extLst>
+            <a:ext uri="{FF2B5EF4-FFF2-40B4-BE49-F238E27FC236}">
+              <a16:creationId xmlns:a16="http://schemas.microsoft.com/office/drawing/2014/main" id="{76136454-6061-F357-9A79-A235CBCAE256}"/>
+            </a:ext>
+          </a:extLst>
+        </p:cNvPr>
+        <p:cNvGrpSpPr/>
+        <p:nvPr/>
+      </p:nvGrpSpPr>
+      <p:grpSpPr>
+        <a:xfrm>
+          <a:off x="0" y="0"/>
+          <a:ext cx="0" cy="0"/>
+          <a:chOff x="0" y="0"/>
+          <a:chExt cx="0" cy="0"/>
+        </a:xfrm>
+      </p:grpSpPr>
+      <p:sp>
+        <p:nvSpPr>
+          <p:cNvPr id="2" name="Slide Image Placeholder 1">
+            <a:extLst>
+              <a:ext uri="{FF2B5EF4-FFF2-40B4-BE49-F238E27FC236}">
+                <a16:creationId xmlns:a16="http://schemas.microsoft.com/office/drawing/2014/main" id="{EB92C7E6-AE60-BAF4-D218-0D9624C8026C}"/>
+              </a:ext>
+            </a:extLst>
+          </p:cNvPr>
+          <p:cNvSpPr>
+            <a:spLocks noGrp="1" noRot="1" noChangeAspect="1"/>
+          </p:cNvSpPr>
+          <p:nvPr>
+            <p:ph type="sldImg"/>
+          </p:nvPr>
+        </p:nvSpPr>
+        <p:spPr/>
+      </p:sp>
+      <p:sp>
+        <p:nvSpPr>
+          <p:cNvPr id="3" name="Notes Placeholder 2">
+            <a:extLst>
+              <a:ext uri="{FF2B5EF4-FFF2-40B4-BE49-F238E27FC236}">
+                <a16:creationId xmlns:a16="http://schemas.microsoft.com/office/drawing/2014/main" id="{8612AE27-F403-D77B-1CE4-1922ABECF557}"/>
+              </a:ext>
+            </a:extLst>
+          </p:cNvPr>
+          <p:cNvSpPr>
+            <a:spLocks noGrp="1"/>
+          </p:cNvSpPr>
+          <p:nvPr>
+            <p:ph type="body" idx="1"/>
+          </p:nvPr>
+        </p:nvSpPr>
+        <p:spPr/>
+        <p:txBody>
+          <a:bodyPr/>
+          <a:lstStyle/>
+          <a:p>
+            <a:endParaRPr lang="en-CA" dirty="0"/>
+          </a:p>
+        </p:txBody>
+      </p:sp>
+      <p:sp>
+        <p:nvSpPr>
+          <p:cNvPr id="4" name="Slide Number Placeholder 3">
+            <a:extLst>
+              <a:ext uri="{FF2B5EF4-FFF2-40B4-BE49-F238E27FC236}">
+                <a16:creationId xmlns:a16="http://schemas.microsoft.com/office/drawing/2014/main" id="{8D5BA9CF-8B6E-BF81-CF20-16148B84F084}"/>
+              </a:ext>
+            </a:extLst>
+          </p:cNvPr>
+          <p:cNvSpPr>
+            <a:spLocks noGrp="1"/>
+          </p:cNvSpPr>
+          <p:nvPr>
+            <p:ph type="sldNum" sz="quarter" idx="5"/>
+          </p:nvPr>
+        </p:nvSpPr>
+        <p:spPr/>
+        <p:txBody>
+          <a:bodyPr/>
+          <a:lstStyle/>
+          <a:p>
+            <a:fld id="{CFE641A9-FDE3-4583-B812-65C4064188F6}" type="slidenum">
+              <a:rPr lang="en-CA" smtClean="0"/>
+              <a:t>28</a:t>
+            </a:fld>
+            <a:endParaRPr lang="en-CA"/>
+          </a:p>
+        </p:txBody>
+      </p:sp>
+    </p:spTree>
+    <p:extLst>
+      <p:ext uri="{BB962C8B-B14F-4D97-AF65-F5344CB8AC3E}">
+        <p14:creationId xmlns:p14="http://schemas.microsoft.com/office/powerpoint/2010/main" val="3554615405"/>
+      </p:ext>
+    </p:extLst>
+  </p:cSld>
+  <p:clrMapOvr>
+    <a:masterClrMapping/>
+  </p:clrMapOvr>
+</p:notes>
+</file>
+
+<file path=ppt/notesSlides/notesSlide14.xml><?xml version="1.0" encoding="utf-8"?>
+<p:notes xmlns:a="http://schemas.openxmlformats.org/drawingml/2006/main" xmlns:r="http://schemas.openxmlformats.org/officeDocument/2006/relationships" xmlns:p="http://schemas.openxmlformats.org/presentationml/2006/main">
+  <p:cSld>
+    <p:spTree>
+      <p:nvGrpSpPr>
+        <p:cNvPr id="1" name="">
+          <a:extLst>
+            <a:ext uri="{FF2B5EF4-FFF2-40B4-BE49-F238E27FC236}">
               <a16:creationId xmlns:a16="http://schemas.microsoft.com/office/drawing/2014/main" id="{6B1D2B85-E456-CBE6-7C55-660A21742A1B}"/>
             </a:ext>
           </a:extLst>
@@ -689,7 +1129,7 @@
           <a:p>
             <a:fld id="{CFE641A9-FDE3-4583-B812-65C4064188F6}" type="slidenum">
               <a:rPr lang="en-CA" smtClean="0"/>
-              <a:t>23</a:t>
+              <a:t>31</a:t>
             </a:fld>
             <a:endParaRPr lang="en-CA"/>
           </a:p>
@@ -708,7 +1148,7 @@
 </p:notes>
 </file>
 
-<file path=ppt/notesSlides/notesSlide11.xml><?xml version="1.0" encoding="utf-8"?>
+<file path=ppt/notesSlides/notesSlide15.xml><?xml version="1.0" encoding="utf-8"?>
 <p:notes xmlns:a="http://schemas.openxmlformats.org/drawingml/2006/main" xmlns:r="http://schemas.openxmlformats.org/officeDocument/2006/relationships" xmlns:p="http://schemas.openxmlformats.org/presentationml/2006/main">
   <p:cSld>
     <p:spTree>
@@ -797,7 +1237,7 @@
           <a:p>
             <a:fld id="{CFE641A9-FDE3-4583-B812-65C4064188F6}" type="slidenum">
               <a:rPr lang="en-CA" smtClean="0"/>
-              <a:t>25</a:t>
+              <a:t>33</a:t>
             </a:fld>
             <a:endParaRPr lang="en-CA"/>
           </a:p>
@@ -816,7 +1256,7 @@
 </p:notes>
 </file>
 
-<file path=ppt/notesSlides/notesSlide12.xml><?xml version="1.0" encoding="utf-8"?>
+<file path=ppt/notesSlides/notesSlide16.xml><?xml version="1.0" encoding="utf-8"?>
 <p:notes xmlns:a="http://schemas.openxmlformats.org/drawingml/2006/main" xmlns:r="http://schemas.openxmlformats.org/officeDocument/2006/relationships" xmlns:p="http://schemas.openxmlformats.org/presentationml/2006/main">
   <p:cSld>
     <p:spTree>
@@ -905,7 +1345,7 @@
           <a:p>
             <a:fld id="{CFE641A9-FDE3-4583-B812-65C4064188F6}" type="slidenum">
               <a:rPr lang="en-CA" smtClean="0"/>
-              <a:t>27</a:t>
+              <a:t>35</a:t>
             </a:fld>
             <a:endParaRPr lang="en-CA"/>
           </a:p>
@@ -924,7 +1364,7 @@
 </p:notes>
 </file>
 
-<file path=ppt/notesSlides/notesSlide13.xml><?xml version="1.0" encoding="utf-8"?>
+<file path=ppt/notesSlides/notesSlide17.xml><?xml version="1.0" encoding="utf-8"?>
 <p:notes xmlns:a="http://schemas.openxmlformats.org/drawingml/2006/main" xmlns:r="http://schemas.openxmlformats.org/officeDocument/2006/relationships" xmlns:p="http://schemas.openxmlformats.org/presentationml/2006/main">
   <p:cSld>
     <p:spTree>
@@ -989,7 +1429,7 @@
           <a:p>
             <a:fld id="{CFE641A9-FDE3-4583-B812-65C4064188F6}" type="slidenum">
               <a:rPr lang="en-CA" smtClean="0"/>
-              <a:t>29</a:t>
+              <a:t>37</a:t>
             </a:fld>
             <a:endParaRPr lang="en-CA"/>
           </a:p>
@@ -1124,6 +1564,438 @@
         <p:cNvPr id="1" name="">
           <a:extLst>
             <a:ext uri="{FF2B5EF4-FFF2-40B4-BE49-F238E27FC236}">
+              <a16:creationId xmlns:a16="http://schemas.microsoft.com/office/drawing/2014/main" id="{D1BB8AA7-95E9-3549-30F3-2B533AA028F5}"/>
+            </a:ext>
+          </a:extLst>
+        </p:cNvPr>
+        <p:cNvGrpSpPr/>
+        <p:nvPr/>
+      </p:nvGrpSpPr>
+      <p:grpSpPr>
+        <a:xfrm>
+          <a:off x="0" y="0"/>
+          <a:ext cx="0" cy="0"/>
+          <a:chOff x="0" y="0"/>
+          <a:chExt cx="0" cy="0"/>
+        </a:xfrm>
+      </p:grpSpPr>
+      <p:sp>
+        <p:nvSpPr>
+          <p:cNvPr id="2" name="Slide Image Placeholder 1">
+            <a:extLst>
+              <a:ext uri="{FF2B5EF4-FFF2-40B4-BE49-F238E27FC236}">
+                <a16:creationId xmlns:a16="http://schemas.microsoft.com/office/drawing/2014/main" id="{99BB8752-C939-E0A6-D433-09EC253517B2}"/>
+              </a:ext>
+            </a:extLst>
+          </p:cNvPr>
+          <p:cNvSpPr>
+            <a:spLocks noGrp="1" noRot="1" noChangeAspect="1"/>
+          </p:cNvSpPr>
+          <p:nvPr>
+            <p:ph type="sldImg"/>
+          </p:nvPr>
+        </p:nvSpPr>
+        <p:spPr/>
+      </p:sp>
+      <p:sp>
+        <p:nvSpPr>
+          <p:cNvPr id="3" name="Notes Placeholder 2">
+            <a:extLst>
+              <a:ext uri="{FF2B5EF4-FFF2-40B4-BE49-F238E27FC236}">
+                <a16:creationId xmlns:a16="http://schemas.microsoft.com/office/drawing/2014/main" id="{84AE5380-5FAF-1495-42D4-FB958EF0A21F}"/>
+              </a:ext>
+            </a:extLst>
+          </p:cNvPr>
+          <p:cNvSpPr>
+            <a:spLocks noGrp="1"/>
+          </p:cNvSpPr>
+          <p:nvPr>
+            <p:ph type="body" idx="1"/>
+          </p:nvPr>
+        </p:nvSpPr>
+        <p:spPr/>
+        <p:txBody>
+          <a:bodyPr/>
+          <a:lstStyle/>
+          <a:p>
+            <a:endParaRPr lang="en-CA" dirty="0"/>
+          </a:p>
+        </p:txBody>
+      </p:sp>
+      <p:sp>
+        <p:nvSpPr>
+          <p:cNvPr id="4" name="Slide Number Placeholder 3">
+            <a:extLst>
+              <a:ext uri="{FF2B5EF4-FFF2-40B4-BE49-F238E27FC236}">
+                <a16:creationId xmlns:a16="http://schemas.microsoft.com/office/drawing/2014/main" id="{B0BC8A2B-F13F-2168-981D-62E0E4A03639}"/>
+              </a:ext>
+            </a:extLst>
+          </p:cNvPr>
+          <p:cNvSpPr>
+            <a:spLocks noGrp="1"/>
+          </p:cNvSpPr>
+          <p:nvPr>
+            <p:ph type="sldNum" sz="quarter" idx="5"/>
+          </p:nvPr>
+        </p:nvSpPr>
+        <p:spPr/>
+        <p:txBody>
+          <a:bodyPr/>
+          <a:lstStyle/>
+          <a:p>
+            <a:fld id="{CFE641A9-FDE3-4583-B812-65C4064188F6}" type="slidenum">
+              <a:rPr lang="en-CA" smtClean="0"/>
+              <a:t>8</a:t>
+            </a:fld>
+            <a:endParaRPr lang="en-CA"/>
+          </a:p>
+        </p:txBody>
+      </p:sp>
+    </p:spTree>
+    <p:extLst>
+      <p:ext uri="{BB962C8B-B14F-4D97-AF65-F5344CB8AC3E}">
+        <p14:creationId xmlns:p14="http://schemas.microsoft.com/office/powerpoint/2010/main" val="4090665050"/>
+      </p:ext>
+    </p:extLst>
+  </p:cSld>
+  <p:clrMapOvr>
+    <a:masterClrMapping/>
+  </p:clrMapOvr>
+</p:notes>
+</file>
+
+<file path=ppt/notesSlides/notesSlide4.xml><?xml version="1.0" encoding="utf-8"?>
+<p:notes xmlns:a="http://schemas.openxmlformats.org/drawingml/2006/main" xmlns:r="http://schemas.openxmlformats.org/officeDocument/2006/relationships" xmlns:p="http://schemas.openxmlformats.org/presentationml/2006/main">
+  <p:cSld>
+    <p:spTree>
+      <p:nvGrpSpPr>
+        <p:cNvPr id="1" name="">
+          <a:extLst>
+            <a:ext uri="{FF2B5EF4-FFF2-40B4-BE49-F238E27FC236}">
+              <a16:creationId xmlns:a16="http://schemas.microsoft.com/office/drawing/2014/main" id="{7C4E58AE-DEED-BC57-6253-696256AE00C8}"/>
+            </a:ext>
+          </a:extLst>
+        </p:cNvPr>
+        <p:cNvGrpSpPr/>
+        <p:nvPr/>
+      </p:nvGrpSpPr>
+      <p:grpSpPr>
+        <a:xfrm>
+          <a:off x="0" y="0"/>
+          <a:ext cx="0" cy="0"/>
+          <a:chOff x="0" y="0"/>
+          <a:chExt cx="0" cy="0"/>
+        </a:xfrm>
+      </p:grpSpPr>
+      <p:sp>
+        <p:nvSpPr>
+          <p:cNvPr id="2" name="Slide Image Placeholder 1">
+            <a:extLst>
+              <a:ext uri="{FF2B5EF4-FFF2-40B4-BE49-F238E27FC236}">
+                <a16:creationId xmlns:a16="http://schemas.microsoft.com/office/drawing/2014/main" id="{068DBE22-9D5B-5966-0EA6-85F9746DF2A7}"/>
+              </a:ext>
+            </a:extLst>
+          </p:cNvPr>
+          <p:cNvSpPr>
+            <a:spLocks noGrp="1" noRot="1" noChangeAspect="1"/>
+          </p:cNvSpPr>
+          <p:nvPr>
+            <p:ph type="sldImg"/>
+          </p:nvPr>
+        </p:nvSpPr>
+        <p:spPr/>
+      </p:sp>
+      <p:sp>
+        <p:nvSpPr>
+          <p:cNvPr id="3" name="Notes Placeholder 2">
+            <a:extLst>
+              <a:ext uri="{FF2B5EF4-FFF2-40B4-BE49-F238E27FC236}">
+                <a16:creationId xmlns:a16="http://schemas.microsoft.com/office/drawing/2014/main" id="{5A91F618-0C8C-26E0-0CF1-90EC2F5C9E1A}"/>
+              </a:ext>
+            </a:extLst>
+          </p:cNvPr>
+          <p:cNvSpPr>
+            <a:spLocks noGrp="1"/>
+          </p:cNvSpPr>
+          <p:nvPr>
+            <p:ph type="body" idx="1"/>
+          </p:nvPr>
+        </p:nvSpPr>
+        <p:spPr/>
+        <p:txBody>
+          <a:bodyPr/>
+          <a:lstStyle/>
+          <a:p>
+            <a:endParaRPr lang="en-CA" dirty="0"/>
+          </a:p>
+        </p:txBody>
+      </p:sp>
+      <p:sp>
+        <p:nvSpPr>
+          <p:cNvPr id="4" name="Slide Number Placeholder 3">
+            <a:extLst>
+              <a:ext uri="{FF2B5EF4-FFF2-40B4-BE49-F238E27FC236}">
+                <a16:creationId xmlns:a16="http://schemas.microsoft.com/office/drawing/2014/main" id="{3DD35597-1F79-E4C0-22A0-04F83E6E2B45}"/>
+              </a:ext>
+            </a:extLst>
+          </p:cNvPr>
+          <p:cNvSpPr>
+            <a:spLocks noGrp="1"/>
+          </p:cNvSpPr>
+          <p:nvPr>
+            <p:ph type="sldNum" sz="quarter" idx="5"/>
+          </p:nvPr>
+        </p:nvSpPr>
+        <p:spPr/>
+        <p:txBody>
+          <a:bodyPr/>
+          <a:lstStyle/>
+          <a:p>
+            <a:fld id="{CFE641A9-FDE3-4583-B812-65C4064188F6}" type="slidenum">
+              <a:rPr lang="en-CA" smtClean="0"/>
+              <a:t>10</a:t>
+            </a:fld>
+            <a:endParaRPr lang="en-CA"/>
+          </a:p>
+        </p:txBody>
+      </p:sp>
+    </p:spTree>
+    <p:extLst>
+      <p:ext uri="{BB962C8B-B14F-4D97-AF65-F5344CB8AC3E}">
+        <p14:creationId xmlns:p14="http://schemas.microsoft.com/office/powerpoint/2010/main" val="1093583267"/>
+      </p:ext>
+    </p:extLst>
+  </p:cSld>
+  <p:clrMapOvr>
+    <a:masterClrMapping/>
+  </p:clrMapOvr>
+</p:notes>
+</file>
+
+<file path=ppt/notesSlides/notesSlide5.xml><?xml version="1.0" encoding="utf-8"?>
+<p:notes xmlns:a="http://schemas.openxmlformats.org/drawingml/2006/main" xmlns:r="http://schemas.openxmlformats.org/officeDocument/2006/relationships" xmlns:p="http://schemas.openxmlformats.org/presentationml/2006/main">
+  <p:cSld>
+    <p:spTree>
+      <p:nvGrpSpPr>
+        <p:cNvPr id="1" name="">
+          <a:extLst>
+            <a:ext uri="{FF2B5EF4-FFF2-40B4-BE49-F238E27FC236}">
+              <a16:creationId xmlns:a16="http://schemas.microsoft.com/office/drawing/2014/main" id="{83262E75-D6E9-AF40-79FD-BBF2AE7EA424}"/>
+            </a:ext>
+          </a:extLst>
+        </p:cNvPr>
+        <p:cNvGrpSpPr/>
+        <p:nvPr/>
+      </p:nvGrpSpPr>
+      <p:grpSpPr>
+        <a:xfrm>
+          <a:off x="0" y="0"/>
+          <a:ext cx="0" cy="0"/>
+          <a:chOff x="0" y="0"/>
+          <a:chExt cx="0" cy="0"/>
+        </a:xfrm>
+      </p:grpSpPr>
+      <p:sp>
+        <p:nvSpPr>
+          <p:cNvPr id="2" name="Slide Image Placeholder 1">
+            <a:extLst>
+              <a:ext uri="{FF2B5EF4-FFF2-40B4-BE49-F238E27FC236}">
+                <a16:creationId xmlns:a16="http://schemas.microsoft.com/office/drawing/2014/main" id="{F0DD9E8F-1DEE-EFDC-0F2E-E5EF66A1A4B1}"/>
+              </a:ext>
+            </a:extLst>
+          </p:cNvPr>
+          <p:cNvSpPr>
+            <a:spLocks noGrp="1" noRot="1" noChangeAspect="1"/>
+          </p:cNvSpPr>
+          <p:nvPr>
+            <p:ph type="sldImg"/>
+          </p:nvPr>
+        </p:nvSpPr>
+        <p:spPr/>
+      </p:sp>
+      <p:sp>
+        <p:nvSpPr>
+          <p:cNvPr id="3" name="Notes Placeholder 2">
+            <a:extLst>
+              <a:ext uri="{FF2B5EF4-FFF2-40B4-BE49-F238E27FC236}">
+                <a16:creationId xmlns:a16="http://schemas.microsoft.com/office/drawing/2014/main" id="{000E6843-AC39-91E1-04D7-F037F8791CBE}"/>
+              </a:ext>
+            </a:extLst>
+          </p:cNvPr>
+          <p:cNvSpPr>
+            <a:spLocks noGrp="1"/>
+          </p:cNvSpPr>
+          <p:nvPr>
+            <p:ph type="body" idx="1"/>
+          </p:nvPr>
+        </p:nvSpPr>
+        <p:spPr/>
+        <p:txBody>
+          <a:bodyPr/>
+          <a:lstStyle/>
+          <a:p>
+            <a:endParaRPr lang="en-CA" dirty="0"/>
+          </a:p>
+        </p:txBody>
+      </p:sp>
+      <p:sp>
+        <p:nvSpPr>
+          <p:cNvPr id="4" name="Slide Number Placeholder 3">
+            <a:extLst>
+              <a:ext uri="{FF2B5EF4-FFF2-40B4-BE49-F238E27FC236}">
+                <a16:creationId xmlns:a16="http://schemas.microsoft.com/office/drawing/2014/main" id="{6DA7C37E-2DCA-C71C-77B6-850E14E586C1}"/>
+              </a:ext>
+            </a:extLst>
+          </p:cNvPr>
+          <p:cNvSpPr>
+            <a:spLocks noGrp="1"/>
+          </p:cNvSpPr>
+          <p:nvPr>
+            <p:ph type="sldNum" sz="quarter" idx="5"/>
+          </p:nvPr>
+        </p:nvSpPr>
+        <p:spPr/>
+        <p:txBody>
+          <a:bodyPr/>
+          <a:lstStyle/>
+          <a:p>
+            <a:fld id="{CFE641A9-FDE3-4583-B812-65C4064188F6}" type="slidenum">
+              <a:rPr lang="en-CA" smtClean="0"/>
+              <a:t>12</a:t>
+            </a:fld>
+            <a:endParaRPr lang="en-CA"/>
+          </a:p>
+        </p:txBody>
+      </p:sp>
+    </p:spTree>
+    <p:extLst>
+      <p:ext uri="{BB962C8B-B14F-4D97-AF65-F5344CB8AC3E}">
+        <p14:creationId xmlns:p14="http://schemas.microsoft.com/office/powerpoint/2010/main" val="3680549801"/>
+      </p:ext>
+    </p:extLst>
+  </p:cSld>
+  <p:clrMapOvr>
+    <a:masterClrMapping/>
+  </p:clrMapOvr>
+</p:notes>
+</file>
+
+<file path=ppt/notesSlides/notesSlide6.xml><?xml version="1.0" encoding="utf-8"?>
+<p:notes xmlns:a="http://schemas.openxmlformats.org/drawingml/2006/main" xmlns:r="http://schemas.openxmlformats.org/officeDocument/2006/relationships" xmlns:p="http://schemas.openxmlformats.org/presentationml/2006/main">
+  <p:cSld>
+    <p:spTree>
+      <p:nvGrpSpPr>
+        <p:cNvPr id="1" name="">
+          <a:extLst>
+            <a:ext uri="{FF2B5EF4-FFF2-40B4-BE49-F238E27FC236}">
+              <a16:creationId xmlns:a16="http://schemas.microsoft.com/office/drawing/2014/main" id="{F45A4C01-C84C-9427-B684-2E837D4865CA}"/>
+            </a:ext>
+          </a:extLst>
+        </p:cNvPr>
+        <p:cNvGrpSpPr/>
+        <p:nvPr/>
+      </p:nvGrpSpPr>
+      <p:grpSpPr>
+        <a:xfrm>
+          <a:off x="0" y="0"/>
+          <a:ext cx="0" cy="0"/>
+          <a:chOff x="0" y="0"/>
+          <a:chExt cx="0" cy="0"/>
+        </a:xfrm>
+      </p:grpSpPr>
+      <p:sp>
+        <p:nvSpPr>
+          <p:cNvPr id="2" name="Slide Image Placeholder 1">
+            <a:extLst>
+              <a:ext uri="{FF2B5EF4-FFF2-40B4-BE49-F238E27FC236}">
+                <a16:creationId xmlns:a16="http://schemas.microsoft.com/office/drawing/2014/main" id="{249925F4-851D-1E92-3AE0-0CC265989F57}"/>
+              </a:ext>
+            </a:extLst>
+          </p:cNvPr>
+          <p:cNvSpPr>
+            <a:spLocks noGrp="1" noRot="1" noChangeAspect="1"/>
+          </p:cNvSpPr>
+          <p:nvPr>
+            <p:ph type="sldImg"/>
+          </p:nvPr>
+        </p:nvSpPr>
+        <p:spPr/>
+      </p:sp>
+      <p:sp>
+        <p:nvSpPr>
+          <p:cNvPr id="3" name="Notes Placeholder 2">
+            <a:extLst>
+              <a:ext uri="{FF2B5EF4-FFF2-40B4-BE49-F238E27FC236}">
+                <a16:creationId xmlns:a16="http://schemas.microsoft.com/office/drawing/2014/main" id="{886C2922-EE37-3755-0762-3D6AAAEEA338}"/>
+              </a:ext>
+            </a:extLst>
+          </p:cNvPr>
+          <p:cNvSpPr>
+            <a:spLocks noGrp="1"/>
+          </p:cNvSpPr>
+          <p:nvPr>
+            <p:ph type="body" idx="1"/>
+          </p:nvPr>
+        </p:nvSpPr>
+        <p:spPr/>
+        <p:txBody>
+          <a:bodyPr/>
+          <a:lstStyle/>
+          <a:p>
+            <a:endParaRPr lang="en-CA" dirty="0"/>
+          </a:p>
+        </p:txBody>
+      </p:sp>
+      <p:sp>
+        <p:nvSpPr>
+          <p:cNvPr id="4" name="Slide Number Placeholder 3">
+            <a:extLst>
+              <a:ext uri="{FF2B5EF4-FFF2-40B4-BE49-F238E27FC236}">
+                <a16:creationId xmlns:a16="http://schemas.microsoft.com/office/drawing/2014/main" id="{704ACD58-4EA1-A06B-85CC-C9B4D93CC68F}"/>
+              </a:ext>
+            </a:extLst>
+          </p:cNvPr>
+          <p:cNvSpPr>
+            <a:spLocks noGrp="1"/>
+          </p:cNvSpPr>
+          <p:nvPr>
+            <p:ph type="sldNum" sz="quarter" idx="5"/>
+          </p:nvPr>
+        </p:nvSpPr>
+        <p:spPr/>
+        <p:txBody>
+          <a:bodyPr/>
+          <a:lstStyle/>
+          <a:p>
+            <a:fld id="{CFE641A9-FDE3-4583-B812-65C4064188F6}" type="slidenum">
+              <a:rPr lang="en-CA" smtClean="0"/>
+              <a:t>14</a:t>
+            </a:fld>
+            <a:endParaRPr lang="en-CA"/>
+          </a:p>
+        </p:txBody>
+      </p:sp>
+    </p:spTree>
+    <p:extLst>
+      <p:ext uri="{BB962C8B-B14F-4D97-AF65-F5344CB8AC3E}">
+        <p14:creationId xmlns:p14="http://schemas.microsoft.com/office/powerpoint/2010/main" val="152872442"/>
+      </p:ext>
+    </p:extLst>
+  </p:cSld>
+  <p:clrMapOvr>
+    <a:masterClrMapping/>
+  </p:clrMapOvr>
+</p:notes>
+</file>
+
+<file path=ppt/notesSlides/notesSlide7.xml><?xml version="1.0" encoding="utf-8"?>
+<p:notes xmlns:a="http://schemas.openxmlformats.org/drawingml/2006/main" xmlns:r="http://schemas.openxmlformats.org/officeDocument/2006/relationships" xmlns:p="http://schemas.openxmlformats.org/presentationml/2006/main">
+  <p:cSld>
+    <p:spTree>
+      <p:nvGrpSpPr>
+        <p:cNvPr id="1" name="">
+          <a:extLst>
+            <a:ext uri="{FF2B5EF4-FFF2-40B4-BE49-F238E27FC236}">
               <a16:creationId xmlns:a16="http://schemas.microsoft.com/office/drawing/2014/main" id="{5F7EC574-A905-95F7-797C-4FA7A8083F69}"/>
             </a:ext>
           </a:extLst>
@@ -1205,7 +2077,7 @@
           <a:p>
             <a:fld id="{CFE641A9-FDE3-4583-B812-65C4064188F6}" type="slidenum">
               <a:rPr lang="en-CA" smtClean="0"/>
-              <a:t>8</a:t>
+              <a:t>16</a:t>
             </a:fld>
             <a:endParaRPr lang="en-CA"/>
           </a:p>
@@ -1224,7 +2096,7 @@
 </p:notes>
 </file>
 
-<file path=ppt/notesSlides/notesSlide4.xml><?xml version="1.0" encoding="utf-8"?>
+<file path=ppt/notesSlides/notesSlide8.xml><?xml version="1.0" encoding="utf-8"?>
 <p:notes xmlns:a="http://schemas.openxmlformats.org/drawingml/2006/main" xmlns:r="http://schemas.openxmlformats.org/officeDocument/2006/relationships" xmlns:p="http://schemas.openxmlformats.org/presentationml/2006/main">
   <p:cSld>
     <p:spTree>
@@ -1313,7 +2185,7 @@
           <a:p>
             <a:fld id="{CFE641A9-FDE3-4583-B812-65C4064188F6}" type="slidenum">
               <a:rPr lang="en-CA" smtClean="0"/>
-              <a:t>10</a:t>
+              <a:t>18</a:t>
             </a:fld>
             <a:endParaRPr lang="en-CA"/>
           </a:p>
@@ -1332,7 +2204,7 @@
 </p:notes>
 </file>
 
-<file path=ppt/notesSlides/notesSlide5.xml><?xml version="1.0" encoding="utf-8"?>
+<file path=ppt/notesSlides/notesSlide9.xml><?xml version="1.0" encoding="utf-8"?>
 <p:notes xmlns:a="http://schemas.openxmlformats.org/drawingml/2006/main" xmlns:r="http://schemas.openxmlformats.org/officeDocument/2006/relationships" xmlns:p="http://schemas.openxmlformats.org/presentationml/2006/main">
   <p:cSld>
     <p:spTree>
@@ -1421,7 +2293,7 @@
           <a:p>
             <a:fld id="{CFE641A9-FDE3-4583-B812-65C4064188F6}" type="slidenum">
               <a:rPr lang="en-CA" smtClean="0"/>
-              <a:t>12</a:t>
+              <a:t>20</a:t>
             </a:fld>
             <a:endParaRPr lang="en-CA"/>
           </a:p>
@@ -1431,438 +2303,6 @@
     <p:extLst>
       <p:ext uri="{BB962C8B-B14F-4D97-AF65-F5344CB8AC3E}">
         <p14:creationId xmlns:p14="http://schemas.microsoft.com/office/powerpoint/2010/main" val="1266677107"/>
-      </p:ext>
-    </p:extLst>
-  </p:cSld>
-  <p:clrMapOvr>
-    <a:masterClrMapping/>
-  </p:clrMapOvr>
-</p:notes>
-</file>
-
-<file path=ppt/notesSlides/notesSlide6.xml><?xml version="1.0" encoding="utf-8"?>
-<p:notes xmlns:a="http://schemas.openxmlformats.org/drawingml/2006/main" xmlns:r="http://schemas.openxmlformats.org/officeDocument/2006/relationships" xmlns:p="http://schemas.openxmlformats.org/presentationml/2006/main">
-  <p:cSld>
-    <p:spTree>
-      <p:nvGrpSpPr>
-        <p:cNvPr id="1" name="">
-          <a:extLst>
-            <a:ext uri="{FF2B5EF4-FFF2-40B4-BE49-F238E27FC236}">
-              <a16:creationId xmlns:a16="http://schemas.microsoft.com/office/drawing/2014/main" id="{B8C1EE06-EC41-2887-B8ED-376F549D263D}"/>
-            </a:ext>
-          </a:extLst>
-        </p:cNvPr>
-        <p:cNvGrpSpPr/>
-        <p:nvPr/>
-      </p:nvGrpSpPr>
-      <p:grpSpPr>
-        <a:xfrm>
-          <a:off x="0" y="0"/>
-          <a:ext cx="0" cy="0"/>
-          <a:chOff x="0" y="0"/>
-          <a:chExt cx="0" cy="0"/>
-        </a:xfrm>
-      </p:grpSpPr>
-      <p:sp>
-        <p:nvSpPr>
-          <p:cNvPr id="2" name="Slide Image Placeholder 1">
-            <a:extLst>
-              <a:ext uri="{FF2B5EF4-FFF2-40B4-BE49-F238E27FC236}">
-                <a16:creationId xmlns:a16="http://schemas.microsoft.com/office/drawing/2014/main" id="{4E45B921-CA69-E45C-3AD2-5213B2EEE070}"/>
-              </a:ext>
-            </a:extLst>
-          </p:cNvPr>
-          <p:cNvSpPr>
-            <a:spLocks noGrp="1" noRot="1" noChangeAspect="1"/>
-          </p:cNvSpPr>
-          <p:nvPr>
-            <p:ph type="sldImg"/>
-          </p:nvPr>
-        </p:nvSpPr>
-        <p:spPr/>
-      </p:sp>
-      <p:sp>
-        <p:nvSpPr>
-          <p:cNvPr id="3" name="Notes Placeholder 2">
-            <a:extLst>
-              <a:ext uri="{FF2B5EF4-FFF2-40B4-BE49-F238E27FC236}">
-                <a16:creationId xmlns:a16="http://schemas.microsoft.com/office/drawing/2014/main" id="{B2CB9419-CAC7-64D7-6265-A9D5A30EF369}"/>
-              </a:ext>
-            </a:extLst>
-          </p:cNvPr>
-          <p:cNvSpPr>
-            <a:spLocks noGrp="1"/>
-          </p:cNvSpPr>
-          <p:nvPr>
-            <p:ph type="body" idx="1"/>
-          </p:nvPr>
-        </p:nvSpPr>
-        <p:spPr/>
-        <p:txBody>
-          <a:bodyPr/>
-          <a:lstStyle/>
-          <a:p>
-            <a:endParaRPr lang="en-CA" dirty="0"/>
-          </a:p>
-        </p:txBody>
-      </p:sp>
-      <p:sp>
-        <p:nvSpPr>
-          <p:cNvPr id="4" name="Slide Number Placeholder 3">
-            <a:extLst>
-              <a:ext uri="{FF2B5EF4-FFF2-40B4-BE49-F238E27FC236}">
-                <a16:creationId xmlns:a16="http://schemas.microsoft.com/office/drawing/2014/main" id="{403764FC-9DDD-7E08-4052-EF94133CF82A}"/>
-              </a:ext>
-            </a:extLst>
-          </p:cNvPr>
-          <p:cNvSpPr>
-            <a:spLocks noGrp="1"/>
-          </p:cNvSpPr>
-          <p:nvPr>
-            <p:ph type="sldNum" sz="quarter" idx="5"/>
-          </p:nvPr>
-        </p:nvSpPr>
-        <p:spPr/>
-        <p:txBody>
-          <a:bodyPr/>
-          <a:lstStyle/>
-          <a:p>
-            <a:fld id="{CFE641A9-FDE3-4583-B812-65C4064188F6}" type="slidenum">
-              <a:rPr lang="en-CA" smtClean="0"/>
-              <a:t>14</a:t>
-            </a:fld>
-            <a:endParaRPr lang="en-CA"/>
-          </a:p>
-        </p:txBody>
-      </p:sp>
-    </p:spTree>
-    <p:extLst>
-      <p:ext uri="{BB962C8B-B14F-4D97-AF65-F5344CB8AC3E}">
-        <p14:creationId xmlns:p14="http://schemas.microsoft.com/office/powerpoint/2010/main" val="3075397985"/>
-      </p:ext>
-    </p:extLst>
-  </p:cSld>
-  <p:clrMapOvr>
-    <a:masterClrMapping/>
-  </p:clrMapOvr>
-</p:notes>
-</file>
-
-<file path=ppt/notesSlides/notesSlide7.xml><?xml version="1.0" encoding="utf-8"?>
-<p:notes xmlns:a="http://schemas.openxmlformats.org/drawingml/2006/main" xmlns:r="http://schemas.openxmlformats.org/officeDocument/2006/relationships" xmlns:p="http://schemas.openxmlformats.org/presentationml/2006/main">
-  <p:cSld>
-    <p:spTree>
-      <p:nvGrpSpPr>
-        <p:cNvPr id="1" name="">
-          <a:extLst>
-            <a:ext uri="{FF2B5EF4-FFF2-40B4-BE49-F238E27FC236}">
-              <a16:creationId xmlns:a16="http://schemas.microsoft.com/office/drawing/2014/main" id="{85D5AD3C-FADE-36D0-9862-EB1163B148E9}"/>
-            </a:ext>
-          </a:extLst>
-        </p:cNvPr>
-        <p:cNvGrpSpPr/>
-        <p:nvPr/>
-      </p:nvGrpSpPr>
-      <p:grpSpPr>
-        <a:xfrm>
-          <a:off x="0" y="0"/>
-          <a:ext cx="0" cy="0"/>
-          <a:chOff x="0" y="0"/>
-          <a:chExt cx="0" cy="0"/>
-        </a:xfrm>
-      </p:grpSpPr>
-      <p:sp>
-        <p:nvSpPr>
-          <p:cNvPr id="2" name="Slide Image Placeholder 1">
-            <a:extLst>
-              <a:ext uri="{FF2B5EF4-FFF2-40B4-BE49-F238E27FC236}">
-                <a16:creationId xmlns:a16="http://schemas.microsoft.com/office/drawing/2014/main" id="{20D1821E-663C-E0C1-64B7-8D2AAAD4D4CA}"/>
-              </a:ext>
-            </a:extLst>
-          </p:cNvPr>
-          <p:cNvSpPr>
-            <a:spLocks noGrp="1" noRot="1" noChangeAspect="1"/>
-          </p:cNvSpPr>
-          <p:nvPr>
-            <p:ph type="sldImg"/>
-          </p:nvPr>
-        </p:nvSpPr>
-        <p:spPr/>
-      </p:sp>
-      <p:sp>
-        <p:nvSpPr>
-          <p:cNvPr id="3" name="Notes Placeholder 2">
-            <a:extLst>
-              <a:ext uri="{FF2B5EF4-FFF2-40B4-BE49-F238E27FC236}">
-                <a16:creationId xmlns:a16="http://schemas.microsoft.com/office/drawing/2014/main" id="{E4ADF94A-11EC-BA07-6F22-BA7642B949D7}"/>
-              </a:ext>
-            </a:extLst>
-          </p:cNvPr>
-          <p:cNvSpPr>
-            <a:spLocks noGrp="1"/>
-          </p:cNvSpPr>
-          <p:nvPr>
-            <p:ph type="body" idx="1"/>
-          </p:nvPr>
-        </p:nvSpPr>
-        <p:spPr/>
-        <p:txBody>
-          <a:bodyPr/>
-          <a:lstStyle/>
-          <a:p>
-            <a:endParaRPr lang="en-CA" dirty="0"/>
-          </a:p>
-        </p:txBody>
-      </p:sp>
-      <p:sp>
-        <p:nvSpPr>
-          <p:cNvPr id="4" name="Slide Number Placeholder 3">
-            <a:extLst>
-              <a:ext uri="{FF2B5EF4-FFF2-40B4-BE49-F238E27FC236}">
-                <a16:creationId xmlns:a16="http://schemas.microsoft.com/office/drawing/2014/main" id="{BB0ACBB5-5674-97AD-0CB0-5451BC677F01}"/>
-              </a:ext>
-            </a:extLst>
-          </p:cNvPr>
-          <p:cNvSpPr>
-            <a:spLocks noGrp="1"/>
-          </p:cNvSpPr>
-          <p:nvPr>
-            <p:ph type="sldNum" sz="quarter" idx="5"/>
-          </p:nvPr>
-        </p:nvSpPr>
-        <p:spPr/>
-        <p:txBody>
-          <a:bodyPr/>
-          <a:lstStyle/>
-          <a:p>
-            <a:fld id="{CFE641A9-FDE3-4583-B812-65C4064188F6}" type="slidenum">
-              <a:rPr lang="en-CA" smtClean="0"/>
-              <a:t>16</a:t>
-            </a:fld>
-            <a:endParaRPr lang="en-CA"/>
-          </a:p>
-        </p:txBody>
-      </p:sp>
-    </p:spTree>
-    <p:extLst>
-      <p:ext uri="{BB962C8B-B14F-4D97-AF65-F5344CB8AC3E}">
-        <p14:creationId xmlns:p14="http://schemas.microsoft.com/office/powerpoint/2010/main" val="3739509123"/>
-      </p:ext>
-    </p:extLst>
-  </p:cSld>
-  <p:clrMapOvr>
-    <a:masterClrMapping/>
-  </p:clrMapOvr>
-</p:notes>
-</file>
-
-<file path=ppt/notesSlides/notesSlide8.xml><?xml version="1.0" encoding="utf-8"?>
-<p:notes xmlns:a="http://schemas.openxmlformats.org/drawingml/2006/main" xmlns:r="http://schemas.openxmlformats.org/officeDocument/2006/relationships" xmlns:p="http://schemas.openxmlformats.org/presentationml/2006/main">
-  <p:cSld>
-    <p:spTree>
-      <p:nvGrpSpPr>
-        <p:cNvPr id="1" name="">
-          <a:extLst>
-            <a:ext uri="{FF2B5EF4-FFF2-40B4-BE49-F238E27FC236}">
-              <a16:creationId xmlns:a16="http://schemas.microsoft.com/office/drawing/2014/main" id="{A11A95FE-028A-44DE-35F6-B39A8E93C2B5}"/>
-            </a:ext>
-          </a:extLst>
-        </p:cNvPr>
-        <p:cNvGrpSpPr/>
-        <p:nvPr/>
-      </p:nvGrpSpPr>
-      <p:grpSpPr>
-        <a:xfrm>
-          <a:off x="0" y="0"/>
-          <a:ext cx="0" cy="0"/>
-          <a:chOff x="0" y="0"/>
-          <a:chExt cx="0" cy="0"/>
-        </a:xfrm>
-      </p:grpSpPr>
-      <p:sp>
-        <p:nvSpPr>
-          <p:cNvPr id="2" name="Slide Image Placeholder 1">
-            <a:extLst>
-              <a:ext uri="{FF2B5EF4-FFF2-40B4-BE49-F238E27FC236}">
-                <a16:creationId xmlns:a16="http://schemas.microsoft.com/office/drawing/2014/main" id="{C31FD383-7670-3BEA-08AD-9FB7AB43C31B}"/>
-              </a:ext>
-            </a:extLst>
-          </p:cNvPr>
-          <p:cNvSpPr>
-            <a:spLocks noGrp="1" noRot="1" noChangeAspect="1"/>
-          </p:cNvSpPr>
-          <p:nvPr>
-            <p:ph type="sldImg"/>
-          </p:nvPr>
-        </p:nvSpPr>
-        <p:spPr/>
-      </p:sp>
-      <p:sp>
-        <p:nvSpPr>
-          <p:cNvPr id="3" name="Notes Placeholder 2">
-            <a:extLst>
-              <a:ext uri="{FF2B5EF4-FFF2-40B4-BE49-F238E27FC236}">
-                <a16:creationId xmlns:a16="http://schemas.microsoft.com/office/drawing/2014/main" id="{A97ECF45-17CA-AC2D-D210-3D0C3375B16E}"/>
-              </a:ext>
-            </a:extLst>
-          </p:cNvPr>
-          <p:cNvSpPr>
-            <a:spLocks noGrp="1"/>
-          </p:cNvSpPr>
-          <p:nvPr>
-            <p:ph type="body" idx="1"/>
-          </p:nvPr>
-        </p:nvSpPr>
-        <p:spPr/>
-        <p:txBody>
-          <a:bodyPr/>
-          <a:lstStyle/>
-          <a:p>
-            <a:endParaRPr lang="en-CA" dirty="0"/>
-          </a:p>
-        </p:txBody>
-      </p:sp>
-      <p:sp>
-        <p:nvSpPr>
-          <p:cNvPr id="4" name="Slide Number Placeholder 3">
-            <a:extLst>
-              <a:ext uri="{FF2B5EF4-FFF2-40B4-BE49-F238E27FC236}">
-                <a16:creationId xmlns:a16="http://schemas.microsoft.com/office/drawing/2014/main" id="{94E832F1-6778-3FAA-BE7D-E4E57A6F01F5}"/>
-              </a:ext>
-            </a:extLst>
-          </p:cNvPr>
-          <p:cNvSpPr>
-            <a:spLocks noGrp="1"/>
-          </p:cNvSpPr>
-          <p:nvPr>
-            <p:ph type="sldNum" sz="quarter" idx="5"/>
-          </p:nvPr>
-        </p:nvSpPr>
-        <p:spPr/>
-        <p:txBody>
-          <a:bodyPr/>
-          <a:lstStyle/>
-          <a:p>
-            <a:fld id="{CFE641A9-FDE3-4583-B812-65C4064188F6}" type="slidenum">
-              <a:rPr lang="en-CA" smtClean="0"/>
-              <a:t>18</a:t>
-            </a:fld>
-            <a:endParaRPr lang="en-CA"/>
-          </a:p>
-        </p:txBody>
-      </p:sp>
-    </p:spTree>
-    <p:extLst>
-      <p:ext uri="{BB962C8B-B14F-4D97-AF65-F5344CB8AC3E}">
-        <p14:creationId xmlns:p14="http://schemas.microsoft.com/office/powerpoint/2010/main" val="3230157461"/>
-      </p:ext>
-    </p:extLst>
-  </p:cSld>
-  <p:clrMapOvr>
-    <a:masterClrMapping/>
-  </p:clrMapOvr>
-</p:notes>
-</file>
-
-<file path=ppt/notesSlides/notesSlide9.xml><?xml version="1.0" encoding="utf-8"?>
-<p:notes xmlns:a="http://schemas.openxmlformats.org/drawingml/2006/main" xmlns:r="http://schemas.openxmlformats.org/officeDocument/2006/relationships" xmlns:p="http://schemas.openxmlformats.org/presentationml/2006/main">
-  <p:cSld>
-    <p:spTree>
-      <p:nvGrpSpPr>
-        <p:cNvPr id="1" name="">
-          <a:extLst>
-            <a:ext uri="{FF2B5EF4-FFF2-40B4-BE49-F238E27FC236}">
-              <a16:creationId xmlns:a16="http://schemas.microsoft.com/office/drawing/2014/main" id="{76136454-6061-F357-9A79-A235CBCAE256}"/>
-            </a:ext>
-          </a:extLst>
-        </p:cNvPr>
-        <p:cNvGrpSpPr/>
-        <p:nvPr/>
-      </p:nvGrpSpPr>
-      <p:grpSpPr>
-        <a:xfrm>
-          <a:off x="0" y="0"/>
-          <a:ext cx="0" cy="0"/>
-          <a:chOff x="0" y="0"/>
-          <a:chExt cx="0" cy="0"/>
-        </a:xfrm>
-      </p:grpSpPr>
-      <p:sp>
-        <p:nvSpPr>
-          <p:cNvPr id="2" name="Slide Image Placeholder 1">
-            <a:extLst>
-              <a:ext uri="{FF2B5EF4-FFF2-40B4-BE49-F238E27FC236}">
-                <a16:creationId xmlns:a16="http://schemas.microsoft.com/office/drawing/2014/main" id="{EB92C7E6-AE60-BAF4-D218-0D9624C8026C}"/>
-              </a:ext>
-            </a:extLst>
-          </p:cNvPr>
-          <p:cNvSpPr>
-            <a:spLocks noGrp="1" noRot="1" noChangeAspect="1"/>
-          </p:cNvSpPr>
-          <p:nvPr>
-            <p:ph type="sldImg"/>
-          </p:nvPr>
-        </p:nvSpPr>
-        <p:spPr/>
-      </p:sp>
-      <p:sp>
-        <p:nvSpPr>
-          <p:cNvPr id="3" name="Notes Placeholder 2">
-            <a:extLst>
-              <a:ext uri="{FF2B5EF4-FFF2-40B4-BE49-F238E27FC236}">
-                <a16:creationId xmlns:a16="http://schemas.microsoft.com/office/drawing/2014/main" id="{8612AE27-F403-D77B-1CE4-1922ABECF557}"/>
-              </a:ext>
-            </a:extLst>
-          </p:cNvPr>
-          <p:cNvSpPr>
-            <a:spLocks noGrp="1"/>
-          </p:cNvSpPr>
-          <p:nvPr>
-            <p:ph type="body" idx="1"/>
-          </p:nvPr>
-        </p:nvSpPr>
-        <p:spPr/>
-        <p:txBody>
-          <a:bodyPr/>
-          <a:lstStyle/>
-          <a:p>
-            <a:endParaRPr lang="en-CA" dirty="0"/>
-          </a:p>
-        </p:txBody>
-      </p:sp>
-      <p:sp>
-        <p:nvSpPr>
-          <p:cNvPr id="4" name="Slide Number Placeholder 3">
-            <a:extLst>
-              <a:ext uri="{FF2B5EF4-FFF2-40B4-BE49-F238E27FC236}">
-                <a16:creationId xmlns:a16="http://schemas.microsoft.com/office/drawing/2014/main" id="{8D5BA9CF-8B6E-BF81-CF20-16148B84F084}"/>
-              </a:ext>
-            </a:extLst>
-          </p:cNvPr>
-          <p:cNvSpPr>
-            <a:spLocks noGrp="1"/>
-          </p:cNvSpPr>
-          <p:nvPr>
-            <p:ph type="sldNum" sz="quarter" idx="5"/>
-          </p:nvPr>
-        </p:nvSpPr>
-        <p:spPr/>
-        <p:txBody>
-          <a:bodyPr/>
-          <a:lstStyle/>
-          <a:p>
-            <a:fld id="{CFE641A9-FDE3-4583-B812-65C4064188F6}" type="slidenum">
-              <a:rPr lang="en-CA" smtClean="0"/>
-              <a:t>20</a:t>
-            </a:fld>
-            <a:endParaRPr lang="en-CA"/>
-          </a:p>
-        </p:txBody>
-      </p:sp>
-    </p:spTree>
-    <p:extLst>
-      <p:ext uri="{BB962C8B-B14F-4D97-AF65-F5344CB8AC3E}">
-        <p14:creationId xmlns:p14="http://schemas.microsoft.com/office/powerpoint/2010/main" val="3554615405"/>
       </p:ext>
     </p:extLst>
   </p:cSld>
@@ -2899,7 +3339,7 @@
           <a:p>
             <a:fld id="{42324503-65B2-B147-B7D0-901C284D8BB3}" type="datetimeFigureOut">
               <a:rPr lang="en-US" smtClean="0"/>
-              <a:t>1/22/26</a:t>
+              <a:t>1/24/26</a:t>
             </a:fld>
             <a:endParaRPr lang="en-US"/>
           </a:p>
@@ -3382,7 +3822,7 @@
         <p:cNvPr id="1" name="">
           <a:extLst>
             <a:ext uri="{FF2B5EF4-FFF2-40B4-BE49-F238E27FC236}">
-              <a16:creationId xmlns:a16="http://schemas.microsoft.com/office/drawing/2014/main" id="{86563FF2-718A-9065-98FF-79B579E05215}"/>
+              <a16:creationId xmlns:a16="http://schemas.microsoft.com/office/drawing/2014/main" id="{4FD44B37-6330-3D14-994A-856BB88E24E5}"/>
             </a:ext>
           </a:extLst>
         </p:cNvPr>
@@ -3402,7 +3842,7 @@
           <p:cNvPr id="2" name="Title 1">
             <a:extLst>
               <a:ext uri="{FF2B5EF4-FFF2-40B4-BE49-F238E27FC236}">
-                <a16:creationId xmlns:a16="http://schemas.microsoft.com/office/drawing/2014/main" id="{8B3DA39A-7D80-55AD-196A-84FB7A06FE72}"/>
+                <a16:creationId xmlns:a16="http://schemas.microsoft.com/office/drawing/2014/main" id="{F260D9DD-B0CB-06AD-DA6C-A16CABA60ECC}"/>
               </a:ext>
             </a:extLst>
           </p:cNvPr>
@@ -3425,17 +3865,16 @@
           <a:p>
             <a:pPr algn="ctr"/>
             <a:r>
-              <a:rPr lang="en-CA" b="1" dirty="0"/>
-              <a:t>Fetching Data</a:t>
-            </a:r>
-            <a:endParaRPr lang="en-CA" dirty="0"/>
+              <a:rPr lang="en-CA" dirty="0"/>
+              <a:t>Promise Chaining</a:t>
+            </a:r>
           </a:p>
         </p:txBody>
       </p:sp>
     </p:spTree>
     <p:extLst>
       <p:ext uri="{BB962C8B-B14F-4D97-AF65-F5344CB8AC3E}">
-        <p14:creationId xmlns:p14="http://schemas.microsoft.com/office/powerpoint/2010/main" val="1397644104"/>
+        <p14:creationId xmlns:p14="http://schemas.microsoft.com/office/powerpoint/2010/main" val="3341591696"/>
       </p:ext>
     </p:extLst>
   </p:cSld>
@@ -3453,7 +3892,13 @@
   <p:cSld>
     <p:spTree>
       <p:nvGrpSpPr>
-        <p:cNvPr id="1" name=""/>
+        <p:cNvPr id="1" name="">
+          <a:extLst>
+            <a:ext uri="{FF2B5EF4-FFF2-40B4-BE49-F238E27FC236}">
+              <a16:creationId xmlns:a16="http://schemas.microsoft.com/office/drawing/2014/main" id="{0B4D9768-B8BB-1AEA-D538-D18DEA286C48}"/>
+            </a:ext>
+          </a:extLst>
+        </p:cNvPr>
         <p:cNvGrpSpPr/>
         <p:nvPr/>
       </p:nvGrpSpPr>
@@ -3470,7 +3915,7 @@
           <p:cNvPr id="2" name="Title 1">
             <a:extLst>
               <a:ext uri="{FF2B5EF4-FFF2-40B4-BE49-F238E27FC236}">
-                <a16:creationId xmlns:a16="http://schemas.microsoft.com/office/drawing/2014/main" id="{A7C322B3-1CE3-1E1B-90DB-A3F8D34D397E}"/>
+                <a16:creationId xmlns:a16="http://schemas.microsoft.com/office/drawing/2014/main" id="{71AD0AB4-581D-3B24-E768-6DC3BCB7C472}"/>
               </a:ext>
             </a:extLst>
           </p:cNvPr>
@@ -3488,7 +3933,7 @@
           <a:p>
             <a:r>
               <a:rPr lang="en-US" dirty="0"/>
-              <a:t>Using fetch with async/await</a:t>
+              <a:t>Handling steps in order</a:t>
             </a:r>
           </a:p>
         </p:txBody>
@@ -3498,7 +3943,7 @@
           <p:cNvPr id="3" name="Content Placeholder 2">
             <a:extLst>
               <a:ext uri="{FF2B5EF4-FFF2-40B4-BE49-F238E27FC236}">
-                <a16:creationId xmlns:a16="http://schemas.microsoft.com/office/drawing/2014/main" id="{0C73557C-A9AB-DCBE-122B-7D3F4D1463EA}"/>
+                <a16:creationId xmlns:a16="http://schemas.microsoft.com/office/drawing/2014/main" id="{C6BFE643-E95A-8E85-A833-3F24CA2C5DBC}"/>
               </a:ext>
             </a:extLst>
           </p:cNvPr>
@@ -3520,25 +3965,25 @@
               <a:buNone/>
             </a:pPr>
             <a:r>
-              <a:rPr lang="en-CA" dirty="0">
+              <a:rPr lang="en-US" dirty="0">
                 <a:latin typeface="Consolas" panose="020B0609020204030204" pitchFamily="49" charset="0"/>
                 <a:cs typeface="Consolas" panose="020B0609020204030204" pitchFamily="49" charset="0"/>
               </a:rPr>
-              <a:t>const response = await fetch(</a:t>
-            </a:r>
-            <a:r>
-              <a:rPr lang="en-CA" dirty="0" err="1">
+              <a:t>fetch(</a:t>
+            </a:r>
+            <a:r>
+              <a:rPr lang="en-US" dirty="0" err="1">
                 <a:latin typeface="Consolas" panose="020B0609020204030204" pitchFamily="49" charset="0"/>
                 <a:cs typeface="Consolas" panose="020B0609020204030204" pitchFamily="49" charset="0"/>
               </a:rPr>
               <a:t>url</a:t>
             </a:r>
             <a:r>
-              <a:rPr lang="en-CA" dirty="0">
+              <a:rPr lang="en-US" dirty="0">
                 <a:latin typeface="Consolas" panose="020B0609020204030204" pitchFamily="49" charset="0"/>
                 <a:cs typeface="Consolas" panose="020B0609020204030204" pitchFamily="49" charset="0"/>
               </a:rPr>
-              <a:t>);</a:t>
+              <a:t>)</a:t>
             </a:r>
           </a:p>
           <a:p>
@@ -3546,49 +3991,113 @@
               <a:buNone/>
             </a:pPr>
             <a:r>
-              <a:rPr lang="en-CA" dirty="0">
+              <a:rPr lang="en-US" dirty="0">
                 <a:latin typeface="Consolas" panose="020B0609020204030204" pitchFamily="49" charset="0"/>
                 <a:cs typeface="Consolas" panose="020B0609020204030204" pitchFamily="49" charset="0"/>
               </a:rPr>
-              <a:t>const data = await </a:t>
-            </a:r>
-            <a:r>
-              <a:rPr lang="en-CA" dirty="0" err="1">
+              <a:t>  .then(res =&gt; </a:t>
+            </a:r>
+            <a:r>
+              <a:rPr lang="en-US" dirty="0" err="1">
                 <a:latin typeface="Consolas" panose="020B0609020204030204" pitchFamily="49" charset="0"/>
                 <a:cs typeface="Consolas" panose="020B0609020204030204" pitchFamily="49" charset="0"/>
               </a:rPr>
-              <a:t>response.json</a:t>
-            </a:r>
-            <a:r>
-              <a:rPr lang="en-CA" dirty="0">
+              <a:t>res.json</a:t>
+            </a:r>
+            <a:r>
+              <a:rPr lang="en-US" dirty="0">
                 <a:latin typeface="Consolas" panose="020B0609020204030204" pitchFamily="49" charset="0"/>
                 <a:cs typeface="Consolas" panose="020B0609020204030204" pitchFamily="49" charset="0"/>
               </a:rPr>
-              <a:t>();</a:t>
+              <a:t>())</a:t>
             </a:r>
           </a:p>
           <a:p>
             <a:pPr marL="0" indent="0">
               <a:buNone/>
             </a:pPr>
-            <a:endParaRPr lang="en-CA" dirty="0"/>
-          </a:p>
-          <a:p>
-            <a:r>
-              <a:rPr lang="en-CA" dirty="0"/>
-              <a:t>Await pauses this function</a:t>
-            </a:r>
-          </a:p>
-          <a:p>
-            <a:r>
-              <a:rPr lang="en-CA" dirty="0"/>
-              <a:t>The app keeps running</a:t>
-            </a:r>
-          </a:p>
-          <a:p>
-            <a:r>
-              <a:rPr lang="en-CA" dirty="0"/>
-              <a:t>Data arrives later</a:t>
+            <a:r>
+              <a:rPr lang="en-US" dirty="0">
+                <a:latin typeface="Consolas" panose="020B0609020204030204" pitchFamily="49" charset="0"/>
+                <a:cs typeface="Consolas" panose="020B0609020204030204" pitchFamily="49" charset="0"/>
+              </a:rPr>
+              <a:t>  .then(data =&gt; </a:t>
+            </a:r>
+            <a:r>
+              <a:rPr lang="en-US" dirty="0" err="1">
+                <a:latin typeface="Consolas" panose="020B0609020204030204" pitchFamily="49" charset="0"/>
+                <a:cs typeface="Consolas" panose="020B0609020204030204" pitchFamily="49" charset="0"/>
+              </a:rPr>
+              <a:t>console.log</a:t>
+            </a:r>
+            <a:r>
+              <a:rPr lang="en-US" dirty="0">
+                <a:latin typeface="Consolas" panose="020B0609020204030204" pitchFamily="49" charset="0"/>
+                <a:cs typeface="Consolas" panose="020B0609020204030204" pitchFamily="49" charset="0"/>
+              </a:rPr>
+              <a:t>(data))</a:t>
+            </a:r>
+          </a:p>
+          <a:p>
+            <a:pPr marL="0" indent="0">
+              <a:buNone/>
+            </a:pPr>
+            <a:r>
+              <a:rPr lang="en-US" dirty="0">
+                <a:latin typeface="Consolas" panose="020B0609020204030204" pitchFamily="49" charset="0"/>
+                <a:cs typeface="Consolas" panose="020B0609020204030204" pitchFamily="49" charset="0"/>
+              </a:rPr>
+              <a:t>  .catch(err =&gt; </a:t>
+            </a:r>
+            <a:r>
+              <a:rPr lang="en-US" dirty="0" err="1">
+                <a:latin typeface="Consolas" panose="020B0609020204030204" pitchFamily="49" charset="0"/>
+                <a:cs typeface="Consolas" panose="020B0609020204030204" pitchFamily="49" charset="0"/>
+              </a:rPr>
+              <a:t>console.error</a:t>
+            </a:r>
+            <a:r>
+              <a:rPr lang="en-US" dirty="0">
+                <a:latin typeface="Consolas" panose="020B0609020204030204" pitchFamily="49" charset="0"/>
+                <a:cs typeface="Consolas" panose="020B0609020204030204" pitchFamily="49" charset="0"/>
+              </a:rPr>
+              <a:t>(err));</a:t>
+            </a:r>
+          </a:p>
+          <a:p>
+            <a:pPr marL="0" indent="0">
+              <a:buNone/>
+            </a:pPr>
+            <a:endParaRPr lang="en-US" dirty="0"/>
+          </a:p>
+          <a:p>
+            <a:r>
+              <a:rPr lang="en-US" dirty="0"/>
+              <a:t>Each </a:t>
+            </a:r>
+            <a:r>
+              <a:rPr lang="en-US" dirty="0">
+                <a:latin typeface="Consolas" panose="020B0609020204030204" pitchFamily="49" charset="0"/>
+                <a:cs typeface="Consolas" panose="020B0609020204030204" pitchFamily="49" charset="0"/>
+              </a:rPr>
+              <a:t>.then()</a:t>
+            </a:r>
+            <a:r>
+              <a:rPr lang="en-US" dirty="0"/>
+              <a:t> waits for the previous step</a:t>
+            </a:r>
+          </a:p>
+          <a:p>
+            <a:r>
+              <a:rPr lang="en-US" dirty="0"/>
+              <a:t>Errors bubble to </a:t>
+            </a:r>
+            <a:r>
+              <a:rPr lang="en-US" dirty="0">
+                <a:latin typeface="Consolas" panose="020B0609020204030204" pitchFamily="49" charset="0"/>
+                <a:cs typeface="Consolas" panose="020B0609020204030204" pitchFamily="49" charset="0"/>
+              </a:rPr>
+              <a:t>.catch()</a:t>
             </a:r>
           </a:p>
         </p:txBody>
@@ -3596,7 +4105,7 @@
     </p:spTree>
     <p:extLst>
       <p:ext uri="{BB962C8B-B14F-4D97-AF65-F5344CB8AC3E}">
-        <p14:creationId xmlns:p14="http://schemas.microsoft.com/office/powerpoint/2010/main" val="615880361"/>
+        <p14:creationId xmlns:p14="http://schemas.microsoft.com/office/powerpoint/2010/main" val="3639527614"/>
       </p:ext>
     </p:extLst>
   </p:cSld>
@@ -3614,7 +4123,7 @@
         <p:cNvPr id="1" name="">
           <a:extLst>
             <a:ext uri="{FF2B5EF4-FFF2-40B4-BE49-F238E27FC236}">
-              <a16:creationId xmlns:a16="http://schemas.microsoft.com/office/drawing/2014/main" id="{15F969E2-2604-57B7-BA36-ABE43CCA9F18}"/>
+              <a16:creationId xmlns:a16="http://schemas.microsoft.com/office/drawing/2014/main" id="{09B21F8D-058A-8175-F2A7-5821479ADE23}"/>
             </a:ext>
           </a:extLst>
         </p:cNvPr>
@@ -3634,7 +4143,7 @@
           <p:cNvPr id="2" name="Title 1">
             <a:extLst>
               <a:ext uri="{FF2B5EF4-FFF2-40B4-BE49-F238E27FC236}">
-                <a16:creationId xmlns:a16="http://schemas.microsoft.com/office/drawing/2014/main" id="{2DDBCA8E-683C-3712-D44B-33515BC6ED88}"/>
+                <a16:creationId xmlns:a16="http://schemas.microsoft.com/office/drawing/2014/main" id="{12BF7730-3BB5-F427-473C-7B2489915ABA}"/>
               </a:ext>
             </a:extLst>
           </p:cNvPr>
@@ -3657,17 +4166,16 @@
           <a:p>
             <a:pPr algn="ctr"/>
             <a:r>
-              <a:rPr lang="en-CA" b="1" dirty="0"/>
-              <a:t>Coordinating Data</a:t>
-            </a:r>
-            <a:endParaRPr lang="en-CA" dirty="0"/>
+              <a:rPr lang="en-CA" dirty="0"/>
+              <a:t>async / await</a:t>
+            </a:r>
           </a:p>
         </p:txBody>
       </p:sp>
     </p:spTree>
     <p:extLst>
       <p:ext uri="{BB962C8B-B14F-4D97-AF65-F5344CB8AC3E}">
-        <p14:creationId xmlns:p14="http://schemas.microsoft.com/office/powerpoint/2010/main" val="2568515927"/>
+        <p14:creationId xmlns:p14="http://schemas.microsoft.com/office/powerpoint/2010/main" val="746458785"/>
       </p:ext>
     </p:extLst>
   </p:cSld>
@@ -3685,7 +4193,13 @@
   <p:cSld>
     <p:spTree>
       <p:nvGrpSpPr>
-        <p:cNvPr id="1" name=""/>
+        <p:cNvPr id="1" name="">
+          <a:extLst>
+            <a:ext uri="{FF2B5EF4-FFF2-40B4-BE49-F238E27FC236}">
+              <a16:creationId xmlns:a16="http://schemas.microsoft.com/office/drawing/2014/main" id="{FD6EC1F1-084A-F978-AD19-FC8928A6B025}"/>
+            </a:ext>
+          </a:extLst>
+        </p:cNvPr>
         <p:cNvGrpSpPr/>
         <p:nvPr/>
       </p:nvGrpSpPr>
@@ -3702,7 +4216,7 @@
           <p:cNvPr id="2" name="Title 1">
             <a:extLst>
               <a:ext uri="{FF2B5EF4-FFF2-40B4-BE49-F238E27FC236}">
-                <a16:creationId xmlns:a16="http://schemas.microsoft.com/office/drawing/2014/main" id="{EB3F1CE5-C4AC-4AAD-1BE2-61F7590DDC6B}"/>
+                <a16:creationId xmlns:a16="http://schemas.microsoft.com/office/drawing/2014/main" id="{82E40565-C5D2-B494-7F34-B87C4F83CE61}"/>
               </a:ext>
             </a:extLst>
           </p:cNvPr>
@@ -3720,7 +4234,7 @@
           <a:p>
             <a:r>
               <a:rPr lang="en-US" dirty="0"/>
-              <a:t>App shell as coordinator</a:t>
+              <a:t>Promise syntax made readable</a:t>
             </a:r>
           </a:p>
         </p:txBody>
@@ -3730,7 +4244,7 @@
           <p:cNvPr id="3" name="Content Placeholder 2">
             <a:extLst>
               <a:ext uri="{FF2B5EF4-FFF2-40B4-BE49-F238E27FC236}">
-                <a16:creationId xmlns:a16="http://schemas.microsoft.com/office/drawing/2014/main" id="{659E5B33-C6D8-B4FA-51B9-2D89C29F4E49}"/>
+                <a16:creationId xmlns:a16="http://schemas.microsoft.com/office/drawing/2014/main" id="{B5A43AC8-9404-3E45-2BB8-524319B1AC11}"/>
               </a:ext>
             </a:extLst>
           </p:cNvPr>
@@ -3744,40 +4258,140 @@
         <p:spPr/>
         <p:txBody>
           <a:bodyPr>
-            <a:normAutofit/>
+            <a:normAutofit fontScale="92500" lnSpcReduction="10000"/>
           </a:bodyPr>
           <a:lstStyle/>
-          <a:p>
-            <a:r>
-              <a:rPr lang="en-US" dirty="0"/>
-              <a:t>Owns the fetch</a:t>
-            </a:r>
-          </a:p>
-          <a:p>
-            <a:r>
-              <a:rPr lang="en-US" dirty="0"/>
-              <a:t>Handles success and failure</a:t>
-            </a:r>
-          </a:p>
-          <a:p>
-            <a:r>
-              <a:rPr lang="en-US" dirty="0"/>
-              <a:t>Pushes data into components</a:t>
-            </a:r>
-          </a:p>
           <a:p>
             <a:pPr marL="0" indent="0">
               <a:buNone/>
             </a:pPr>
-            <a:endParaRPr lang="en-US" dirty="0"/>
+            <a:r>
+              <a:rPr lang="en-US" dirty="0">
+                <a:latin typeface="Consolas" panose="020B0609020204030204" pitchFamily="49" charset="0"/>
+                <a:cs typeface="Consolas" panose="020B0609020204030204" pitchFamily="49" charset="0"/>
+              </a:rPr>
+              <a:t>try {</a:t>
+            </a:r>
           </a:p>
           <a:p>
             <a:pPr marL="0" indent="0">
               <a:buNone/>
             </a:pPr>
             <a:r>
-              <a:rPr lang="en-US" dirty="0"/>
-              <a:t>Components stay focused on rendering.</a:t>
+              <a:rPr lang="en-US" dirty="0">
+                <a:latin typeface="Consolas" panose="020B0609020204030204" pitchFamily="49" charset="0"/>
+                <a:cs typeface="Consolas" panose="020B0609020204030204" pitchFamily="49" charset="0"/>
+              </a:rPr>
+              <a:t>  const res = await fetch(</a:t>
+            </a:r>
+            <a:r>
+              <a:rPr lang="en-US" dirty="0" err="1">
+                <a:latin typeface="Consolas" panose="020B0609020204030204" pitchFamily="49" charset="0"/>
+                <a:cs typeface="Consolas" panose="020B0609020204030204" pitchFamily="49" charset="0"/>
+              </a:rPr>
+              <a:t>url</a:t>
+            </a:r>
+            <a:r>
+              <a:rPr lang="en-US" dirty="0">
+                <a:latin typeface="Consolas" panose="020B0609020204030204" pitchFamily="49" charset="0"/>
+                <a:cs typeface="Consolas" panose="020B0609020204030204" pitchFamily="49" charset="0"/>
+              </a:rPr>
+              <a:t>);</a:t>
+            </a:r>
+          </a:p>
+          <a:p>
+            <a:pPr marL="0" indent="0">
+              <a:buNone/>
+            </a:pPr>
+            <a:r>
+              <a:rPr lang="en-US" dirty="0">
+                <a:latin typeface="Consolas" panose="020B0609020204030204" pitchFamily="49" charset="0"/>
+                <a:cs typeface="Consolas" panose="020B0609020204030204" pitchFamily="49" charset="0"/>
+              </a:rPr>
+              <a:t>  const data = await </a:t>
+            </a:r>
+            <a:r>
+              <a:rPr lang="en-US" dirty="0" err="1">
+                <a:latin typeface="Consolas" panose="020B0609020204030204" pitchFamily="49" charset="0"/>
+                <a:cs typeface="Consolas" panose="020B0609020204030204" pitchFamily="49" charset="0"/>
+              </a:rPr>
+              <a:t>res.json</a:t>
+            </a:r>
+            <a:r>
+              <a:rPr lang="en-US" dirty="0">
+                <a:latin typeface="Consolas" panose="020B0609020204030204" pitchFamily="49" charset="0"/>
+                <a:cs typeface="Consolas" panose="020B0609020204030204" pitchFamily="49" charset="0"/>
+              </a:rPr>
+              <a:t>();</a:t>
+            </a:r>
+          </a:p>
+          <a:p>
+            <a:pPr marL="0" indent="0">
+              <a:buNone/>
+            </a:pPr>
+            <a:r>
+              <a:rPr lang="en-US" dirty="0">
+                <a:latin typeface="Consolas" panose="020B0609020204030204" pitchFamily="49" charset="0"/>
+                <a:cs typeface="Consolas" panose="020B0609020204030204" pitchFamily="49" charset="0"/>
+              </a:rPr>
+              <a:t>} catch (err) {</a:t>
+            </a:r>
+          </a:p>
+          <a:p>
+            <a:pPr marL="0" indent="0">
+              <a:buNone/>
+            </a:pPr>
+            <a:r>
+              <a:rPr lang="en-US" dirty="0">
+                <a:latin typeface="Consolas" panose="020B0609020204030204" pitchFamily="49" charset="0"/>
+                <a:cs typeface="Consolas" panose="020B0609020204030204" pitchFamily="49" charset="0"/>
+              </a:rPr>
+              <a:t>  </a:t>
+            </a:r>
+            <a:r>
+              <a:rPr lang="en-US" dirty="0" err="1">
+                <a:latin typeface="Consolas" panose="020B0609020204030204" pitchFamily="49" charset="0"/>
+                <a:cs typeface="Consolas" panose="020B0609020204030204" pitchFamily="49" charset="0"/>
+              </a:rPr>
+              <a:t>console.error</a:t>
+            </a:r>
+            <a:r>
+              <a:rPr lang="en-US" dirty="0">
+                <a:latin typeface="Consolas" panose="020B0609020204030204" pitchFamily="49" charset="0"/>
+                <a:cs typeface="Consolas" panose="020B0609020204030204" pitchFamily="49" charset="0"/>
+              </a:rPr>
+              <a:t>(err);</a:t>
+            </a:r>
+          </a:p>
+          <a:p>
+            <a:pPr marL="0" indent="0">
+              <a:buNone/>
+            </a:pPr>
+            <a:r>
+              <a:rPr lang="en-US" dirty="0">
+                <a:latin typeface="Consolas" panose="020B0609020204030204" pitchFamily="49" charset="0"/>
+                <a:cs typeface="Consolas" panose="020B0609020204030204" pitchFamily="49" charset="0"/>
+              </a:rPr>
+              <a:t>}</a:t>
+            </a:r>
+          </a:p>
+          <a:p>
+            <a:endParaRPr lang="en-US" dirty="0"/>
+          </a:p>
+          <a:p>
+            <a:pPr marL="0" indent="0">
+              <a:buNone/>
+            </a:pPr>
+            <a:r>
+              <a:rPr lang="en-US" dirty="0">
+                <a:latin typeface="Consolas" panose="020B0609020204030204" pitchFamily="49" charset="0"/>
+                <a:cs typeface="Consolas" panose="020B0609020204030204" pitchFamily="49" charset="0"/>
+              </a:rPr>
+              <a:t>async/await</a:t>
+            </a:r>
+            <a:r>
+              <a:rPr lang="en-US" dirty="0"/>
+              <a:t> does not replace Promises, it uses them.</a:t>
             </a:r>
           </a:p>
         </p:txBody>
@@ -3785,7 +4399,7 @@
     </p:spTree>
     <p:extLst>
       <p:ext uri="{BB962C8B-B14F-4D97-AF65-F5344CB8AC3E}">
-        <p14:creationId xmlns:p14="http://schemas.microsoft.com/office/powerpoint/2010/main" val="1122787579"/>
+        <p14:creationId xmlns:p14="http://schemas.microsoft.com/office/powerpoint/2010/main" val="765638903"/>
       </p:ext>
     </p:extLst>
   </p:cSld>
@@ -3803,7 +4417,7 @@
         <p:cNvPr id="1" name="">
           <a:extLst>
             <a:ext uri="{FF2B5EF4-FFF2-40B4-BE49-F238E27FC236}">
-              <a16:creationId xmlns:a16="http://schemas.microsoft.com/office/drawing/2014/main" id="{F69E3A23-E8EF-8998-4BCB-7D3D2FD453F0}"/>
+              <a16:creationId xmlns:a16="http://schemas.microsoft.com/office/drawing/2014/main" id="{B5649BB5-66C3-BD9B-A70C-B3B0E3966F7E}"/>
             </a:ext>
           </a:extLst>
         </p:cNvPr>
@@ -3823,7 +4437,7 @@
           <p:cNvPr id="2" name="Title 1">
             <a:extLst>
               <a:ext uri="{FF2B5EF4-FFF2-40B4-BE49-F238E27FC236}">
-                <a16:creationId xmlns:a16="http://schemas.microsoft.com/office/drawing/2014/main" id="{B129089A-B2A5-EF23-AFB8-AE7917F530B9}"/>
+                <a16:creationId xmlns:a16="http://schemas.microsoft.com/office/drawing/2014/main" id="{29B85B8E-CFB5-5DB8-9F62-98193E27C5F8}"/>
               </a:ext>
             </a:extLst>
           </p:cNvPr>
@@ -3846,8 +4460,12 @@
           <a:p>
             <a:pPr algn="ctr"/>
             <a:r>
+              <a:rPr lang="en-CA" dirty="0" err="1"/>
+              <a:t>Promise.all</a:t>
+            </a:r>
+            <a:r>
               <a:rPr lang="en-CA" dirty="0"/>
-              <a:t>Async States</a:t>
+              <a:t>()</a:t>
             </a:r>
           </a:p>
         </p:txBody>
@@ -3855,7 +4473,7 @@
     </p:spTree>
     <p:extLst>
       <p:ext uri="{BB962C8B-B14F-4D97-AF65-F5344CB8AC3E}">
-        <p14:creationId xmlns:p14="http://schemas.microsoft.com/office/powerpoint/2010/main" val="1986178434"/>
+        <p14:creationId xmlns:p14="http://schemas.microsoft.com/office/powerpoint/2010/main" val="3204336034"/>
       </p:ext>
     </p:extLst>
   </p:cSld>
@@ -3876,7 +4494,7 @@
         <p:cNvPr id="1" name="">
           <a:extLst>
             <a:ext uri="{FF2B5EF4-FFF2-40B4-BE49-F238E27FC236}">
-              <a16:creationId xmlns:a16="http://schemas.microsoft.com/office/drawing/2014/main" id="{2DC9E877-0EA3-695E-C85E-0732EE5FFD4B}"/>
+              <a16:creationId xmlns:a16="http://schemas.microsoft.com/office/drawing/2014/main" id="{1CE2B89F-1AB9-8574-CCFA-ADBF88B732FF}"/>
             </a:ext>
           </a:extLst>
         </p:cNvPr>
@@ -3896,7 +4514,7 @@
           <p:cNvPr id="2" name="Title 1">
             <a:extLst>
               <a:ext uri="{FF2B5EF4-FFF2-40B4-BE49-F238E27FC236}">
-                <a16:creationId xmlns:a16="http://schemas.microsoft.com/office/drawing/2014/main" id="{9D47AC32-BC89-CE84-1701-B2335D5D710C}"/>
+                <a16:creationId xmlns:a16="http://schemas.microsoft.com/office/drawing/2014/main" id="{64523954-8CB9-D9D6-3E5A-0D9235836355}"/>
               </a:ext>
             </a:extLst>
           </p:cNvPr>
@@ -3914,7 +4532,7 @@
           <a:p>
             <a:r>
               <a:rPr lang="en-US" dirty="0"/>
-              <a:t>What we're not solving yet</a:t>
+              <a:t>Coordinating multiple async tasks</a:t>
             </a:r>
           </a:p>
         </p:txBody>
@@ -3924,7 +4542,7 @@
           <p:cNvPr id="3" name="Content Placeholder 2">
             <a:extLst>
               <a:ext uri="{FF2B5EF4-FFF2-40B4-BE49-F238E27FC236}">
-                <a16:creationId xmlns:a16="http://schemas.microsoft.com/office/drawing/2014/main" id="{88C2BF19-AB39-BE49-8C7C-3A29B186222A}"/>
+                <a16:creationId xmlns:a16="http://schemas.microsoft.com/office/drawing/2014/main" id="{36C95859-94EF-C7E0-B65A-C84A04C869D6}"/>
               </a:ext>
             </a:extLst>
           </p:cNvPr>
@@ -3938,37 +4556,137 @@
         <p:spPr/>
         <p:txBody>
           <a:bodyPr>
-            <a:normAutofit/>
+            <a:normAutofit fontScale="92500" lnSpcReduction="10000"/>
           </a:bodyPr>
           <a:lstStyle/>
-          <a:p>
-            <a:r>
-              <a:rPr lang="en-US" dirty="0"/>
-              <a:t>Loading indicators</a:t>
-            </a:r>
-          </a:p>
-          <a:p>
-            <a:r>
-              <a:rPr lang="en-US" dirty="0"/>
-              <a:t>Error messages</a:t>
-            </a:r>
-          </a:p>
-          <a:p>
-            <a:r>
-              <a:rPr lang="en-US" dirty="0"/>
-              <a:t>Retry logic</a:t>
-            </a:r>
-          </a:p>
-          <a:p>
-            <a:endParaRPr lang="en-US" dirty="0"/>
-          </a:p>
           <a:p>
             <a:pPr marL="0" indent="0">
               <a:buNone/>
             </a:pPr>
             <a:r>
-              <a:rPr lang="en-US" dirty="0"/>
-              <a:t>We note these now and add them later.</a:t>
+              <a:rPr lang="en-US" dirty="0">
+                <a:latin typeface="Consolas" panose="020B0609020204030204" pitchFamily="49" charset="0"/>
+                <a:cs typeface="Consolas" panose="020B0609020204030204" pitchFamily="49" charset="0"/>
+              </a:rPr>
+              <a:t>const [a, b] = await </a:t>
+            </a:r>
+            <a:r>
+              <a:rPr lang="en-US" dirty="0" err="1">
+                <a:latin typeface="Consolas" panose="020B0609020204030204" pitchFamily="49" charset="0"/>
+                <a:cs typeface="Consolas" panose="020B0609020204030204" pitchFamily="49" charset="0"/>
+              </a:rPr>
+              <a:t>Promise.all</a:t>
+            </a:r>
+            <a:r>
+              <a:rPr lang="en-US" dirty="0">
+                <a:latin typeface="Consolas" panose="020B0609020204030204" pitchFamily="49" charset="0"/>
+                <a:cs typeface="Consolas" panose="020B0609020204030204" pitchFamily="49" charset="0"/>
+              </a:rPr>
+              <a:t>([</a:t>
+            </a:r>
+          </a:p>
+          <a:p>
+            <a:pPr marL="0" indent="0">
+              <a:buNone/>
+            </a:pPr>
+            <a:r>
+              <a:rPr lang="en-US" dirty="0">
+                <a:latin typeface="Consolas" panose="020B0609020204030204" pitchFamily="49" charset="0"/>
+                <a:cs typeface="Consolas" panose="020B0609020204030204" pitchFamily="49" charset="0"/>
+              </a:rPr>
+              <a:t>  fetch(</a:t>
+            </a:r>
+            <a:r>
+              <a:rPr lang="en-US" dirty="0" err="1">
+                <a:latin typeface="Consolas" panose="020B0609020204030204" pitchFamily="49" charset="0"/>
+                <a:cs typeface="Consolas" panose="020B0609020204030204" pitchFamily="49" charset="0"/>
+              </a:rPr>
+              <a:t>urlA</a:t>
+            </a:r>
+            <a:r>
+              <a:rPr lang="en-US" dirty="0">
+                <a:latin typeface="Consolas" panose="020B0609020204030204" pitchFamily="49" charset="0"/>
+                <a:cs typeface="Consolas" panose="020B0609020204030204" pitchFamily="49" charset="0"/>
+              </a:rPr>
+              <a:t>),</a:t>
+            </a:r>
+          </a:p>
+          <a:p>
+            <a:pPr marL="0" indent="0">
+              <a:buNone/>
+            </a:pPr>
+            <a:r>
+              <a:rPr lang="en-US" dirty="0">
+                <a:latin typeface="Consolas" panose="020B0609020204030204" pitchFamily="49" charset="0"/>
+                <a:cs typeface="Consolas" panose="020B0609020204030204" pitchFamily="49" charset="0"/>
+              </a:rPr>
+              <a:t>  fetch(</a:t>
+            </a:r>
+            <a:r>
+              <a:rPr lang="en-US" dirty="0" err="1">
+                <a:latin typeface="Consolas" panose="020B0609020204030204" pitchFamily="49" charset="0"/>
+                <a:cs typeface="Consolas" panose="020B0609020204030204" pitchFamily="49" charset="0"/>
+              </a:rPr>
+              <a:t>urlB</a:t>
+            </a:r>
+            <a:r>
+              <a:rPr lang="en-US" dirty="0">
+                <a:latin typeface="Consolas" panose="020B0609020204030204" pitchFamily="49" charset="0"/>
+                <a:cs typeface="Consolas" panose="020B0609020204030204" pitchFamily="49" charset="0"/>
+              </a:rPr>
+              <a:t>),</a:t>
+            </a:r>
+          </a:p>
+          <a:p>
+            <a:pPr marL="0" indent="0">
+              <a:buNone/>
+            </a:pPr>
+            <a:r>
+              <a:rPr lang="en-US" dirty="0">
+                <a:latin typeface="Consolas" panose="020B0609020204030204" pitchFamily="49" charset="0"/>
+                <a:cs typeface="Consolas" panose="020B0609020204030204" pitchFamily="49" charset="0"/>
+              </a:rPr>
+              <a:t>]);</a:t>
+            </a:r>
+          </a:p>
+          <a:p>
+            <a:pPr marL="0" indent="0">
+              <a:buNone/>
+            </a:pPr>
+            <a:endParaRPr lang="en-US" dirty="0"/>
+          </a:p>
+          <a:p>
+            <a:r>
+              <a:rPr lang="en-US" dirty="0"/>
+              <a:t>Runs async operations in parallel</a:t>
+            </a:r>
+          </a:p>
+          <a:p>
+            <a:r>
+              <a:rPr lang="en-US" dirty="0"/>
+              <a:t>Resolves when </a:t>
+            </a:r>
+            <a:r>
+              <a:rPr lang="en-US" b="1" dirty="0"/>
+              <a:t>all</a:t>
+            </a:r>
+            <a:r>
+              <a:rPr lang="en-US" dirty="0"/>
+              <a:t> complete</a:t>
+            </a:r>
+          </a:p>
+          <a:p>
+            <a:r>
+              <a:rPr lang="en-US" dirty="0"/>
+              <a:t>Rejects if </a:t>
+            </a:r>
+            <a:r>
+              <a:rPr lang="en-US" b="1" dirty="0"/>
+              <a:t>any</a:t>
+            </a:r>
+            <a:r>
+              <a:rPr lang="en-US" dirty="0"/>
+              <a:t> fail</a:t>
             </a:r>
           </a:p>
         </p:txBody>
@@ -3976,7 +4694,7 @@
     </p:spTree>
     <p:extLst>
       <p:ext uri="{BB962C8B-B14F-4D97-AF65-F5344CB8AC3E}">
-        <p14:creationId xmlns:p14="http://schemas.microsoft.com/office/powerpoint/2010/main" val="1466043018"/>
+        <p14:creationId xmlns:p14="http://schemas.microsoft.com/office/powerpoint/2010/main" val="1830162568"/>
       </p:ext>
     </p:extLst>
   </p:cSld>
@@ -3994,7 +4712,7 @@
         <p:cNvPr id="1" name="">
           <a:extLst>
             <a:ext uri="{FF2B5EF4-FFF2-40B4-BE49-F238E27FC236}">
-              <a16:creationId xmlns:a16="http://schemas.microsoft.com/office/drawing/2014/main" id="{361FB298-8217-C169-8161-DF413241C4E3}"/>
+              <a16:creationId xmlns:a16="http://schemas.microsoft.com/office/drawing/2014/main" id="{853921E6-990F-3418-1CCF-0F1C7C0C63B1}"/>
             </a:ext>
           </a:extLst>
         </p:cNvPr>
@@ -4014,7 +4732,7 @@
           <p:cNvPr id="2" name="Title 1">
             <a:extLst>
               <a:ext uri="{FF2B5EF4-FFF2-40B4-BE49-F238E27FC236}">
-                <a16:creationId xmlns:a16="http://schemas.microsoft.com/office/drawing/2014/main" id="{830E9014-C30C-F16A-8EF8-01B4CC4F2866}"/>
+                <a16:creationId xmlns:a16="http://schemas.microsoft.com/office/drawing/2014/main" id="{BFEF335C-98F7-A233-B3F9-B129C39A633D}"/>
               </a:ext>
             </a:extLst>
           </p:cNvPr>
@@ -4037,16 +4755,17 @@
           <a:p>
             <a:pPr algn="ctr"/>
             <a:r>
-              <a:rPr lang="en-CA" dirty="0"/>
-              <a:t>Stage 2: Component Fetching</a:t>
-            </a:r>
+              <a:rPr lang="en-CA" b="1" dirty="0"/>
+              <a:t>Stage 1: Fetch COORDINATION</a:t>
+            </a:r>
+            <a:endParaRPr lang="en-CA" dirty="0"/>
           </a:p>
         </p:txBody>
       </p:sp>
     </p:spTree>
     <p:extLst>
       <p:ext uri="{BB962C8B-B14F-4D97-AF65-F5344CB8AC3E}">
-        <p14:creationId xmlns:p14="http://schemas.microsoft.com/office/powerpoint/2010/main" val="3583935102"/>
+        <p14:creationId xmlns:p14="http://schemas.microsoft.com/office/powerpoint/2010/main" val="2371156263"/>
       </p:ext>
     </p:extLst>
   </p:cSld>
@@ -4064,13 +4783,7 @@
   <p:cSld>
     <p:spTree>
       <p:nvGrpSpPr>
-        <p:cNvPr id="1" name="">
-          <a:extLst>
-            <a:ext uri="{FF2B5EF4-FFF2-40B4-BE49-F238E27FC236}">
-              <a16:creationId xmlns:a16="http://schemas.microsoft.com/office/drawing/2014/main" id="{554920B6-0F1F-328B-252A-75A46C4CA554}"/>
-            </a:ext>
-          </a:extLst>
-        </p:cNvPr>
+        <p:cNvPr id="1" name=""/>
         <p:cNvGrpSpPr/>
         <p:nvPr/>
       </p:nvGrpSpPr>
@@ -4087,7 +4800,7 @@
           <p:cNvPr id="2" name="Title 1">
             <a:extLst>
               <a:ext uri="{FF2B5EF4-FFF2-40B4-BE49-F238E27FC236}">
-                <a16:creationId xmlns:a16="http://schemas.microsoft.com/office/drawing/2014/main" id="{6EE51C8C-D6C9-F221-FD85-10999210892C}"/>
+                <a16:creationId xmlns:a16="http://schemas.microsoft.com/office/drawing/2014/main" id="{10E899A8-F5D7-3FC8-C4E3-1C1B403ED37A}"/>
               </a:ext>
             </a:extLst>
           </p:cNvPr>
@@ -4105,7 +4818,7 @@
           <a:p>
             <a:r>
               <a:rPr lang="en-US" dirty="0"/>
-              <a:t>Making components reusable</a:t>
+              <a:t>Starting simple</a:t>
             </a:r>
           </a:p>
         </p:txBody>
@@ -4115,7 +4828,7 @@
           <p:cNvPr id="3" name="Content Placeholder 2">
             <a:extLst>
               <a:ext uri="{FF2B5EF4-FFF2-40B4-BE49-F238E27FC236}">
-                <a16:creationId xmlns:a16="http://schemas.microsoft.com/office/drawing/2014/main" id="{73BFC555-A632-BF7A-8E14-013948112165}"/>
+                <a16:creationId xmlns:a16="http://schemas.microsoft.com/office/drawing/2014/main" id="{EDD7D136-F0B8-16E7-3E2E-AA9D4908A883}"/>
               </a:ext>
             </a:extLst>
           </p:cNvPr>
@@ -4128,41 +4841,62 @@
         </p:nvSpPr>
         <p:spPr/>
         <p:txBody>
-          <a:bodyPr>
-            <a:normAutofit/>
-          </a:bodyPr>
-          <a:lstStyle/>
-          <a:p>
-            <a:pPr marL="0" indent="0">
-              <a:buNone/>
+          <a:bodyPr/>
+          <a:lstStyle/>
+          <a:p>
+            <a:pPr marL="514350" indent="-514350">
+              <a:buFont typeface="+mj-lt"/>
+              <a:buAutoNum type="arabicPeriod"/>
             </a:pPr>
             <a:r>
-              <a:rPr lang="en-US" dirty="0"/>
-              <a:t>Instead of fetching in the app shell (e.g., </a:t>
-            </a:r>
-            <a:r>
-              <a:rPr lang="en-US" dirty="0" err="1"/>
-              <a:t>index.js</a:t>
-            </a:r>
-            <a:r>
-              <a:rPr lang="en-US" dirty="0"/>
-              <a:t> or </a:t>
-            </a:r>
-            <a:r>
-              <a:rPr lang="en-US" dirty="0" err="1"/>
-              <a:t>main.js</a:t>
-            </a:r>
-            <a:r>
-              <a:rPr lang="en-US" dirty="0"/>
-              <a:t>), we let the component load its own data.</a:t>
-            </a:r>
+              <a:rPr lang="en-CA" dirty="0"/>
+              <a:t>Application loads</a:t>
+            </a:r>
+          </a:p>
+          <a:p>
+            <a:pPr marL="514350" indent="-514350">
+              <a:buFont typeface="+mj-lt"/>
+              <a:buAutoNum type="arabicPeriod"/>
+            </a:pPr>
+            <a:r>
+              <a:rPr lang="en-CA" dirty="0"/>
+              <a:t>The app container/shell fetches resources</a:t>
+            </a:r>
+          </a:p>
+          <a:p>
+            <a:pPr marL="514350" indent="-514350">
+              <a:buFont typeface="+mj-lt"/>
+              <a:buAutoNum type="arabicPeriod"/>
+            </a:pPr>
+            <a:r>
+              <a:rPr lang="en-CA" dirty="0"/>
+              <a:t>Data is passed into components</a:t>
+            </a:r>
+          </a:p>
+          <a:p>
+            <a:pPr marL="514350" indent="-514350">
+              <a:buFont typeface="+mj-lt"/>
+              <a:buAutoNum type="arabicPeriod"/>
+            </a:pPr>
+            <a:endParaRPr lang="en-CA" dirty="0"/>
+          </a:p>
+          <a:p>
+            <a:pPr marL="514350" indent="-514350">
+              <a:buFont typeface="+mj-lt"/>
+              <a:buAutoNum type="arabicPeriod"/>
+            </a:pPr>
+            <a:r>
+              <a:rPr lang="en-CA" dirty="0"/>
+              <a:t>Everything is explicit and easy to trace.</a:t>
+            </a:r>
+            <a:endParaRPr lang="en-US" dirty="0"/>
           </a:p>
         </p:txBody>
       </p:sp>
     </p:spTree>
     <p:extLst>
       <p:ext uri="{BB962C8B-B14F-4D97-AF65-F5344CB8AC3E}">
-        <p14:creationId xmlns:p14="http://schemas.microsoft.com/office/powerpoint/2010/main" val="4095847557"/>
+        <p14:creationId xmlns:p14="http://schemas.microsoft.com/office/powerpoint/2010/main" val="3800437051"/>
       </p:ext>
     </p:extLst>
   </p:cSld>
@@ -4180,7 +4914,7 @@
         <p:cNvPr id="1" name="">
           <a:extLst>
             <a:ext uri="{FF2B5EF4-FFF2-40B4-BE49-F238E27FC236}">
-              <a16:creationId xmlns:a16="http://schemas.microsoft.com/office/drawing/2014/main" id="{BE1504D3-F223-9EF4-EA4B-2E47191947AC}"/>
+              <a16:creationId xmlns:a16="http://schemas.microsoft.com/office/drawing/2014/main" id="{86563FF2-718A-9065-98FF-79B579E05215}"/>
             </a:ext>
           </a:extLst>
         </p:cNvPr>
@@ -4200,7 +4934,7 @@
           <p:cNvPr id="2" name="Title 1">
             <a:extLst>
               <a:ext uri="{FF2B5EF4-FFF2-40B4-BE49-F238E27FC236}">
-                <a16:creationId xmlns:a16="http://schemas.microsoft.com/office/drawing/2014/main" id="{E0FE4681-FBA1-4ED3-F886-DE9C12BA0C86}"/>
+                <a16:creationId xmlns:a16="http://schemas.microsoft.com/office/drawing/2014/main" id="{8B3DA39A-7D80-55AD-196A-84FB7A06FE72}"/>
               </a:ext>
             </a:extLst>
           </p:cNvPr>
@@ -4223,16 +4957,17 @@
           <a:p>
             <a:pPr algn="ctr"/>
             <a:r>
-              <a:rPr lang="en-CA" dirty="0"/>
-              <a:t>Passing the endpoint</a:t>
-            </a:r>
+              <a:rPr lang="en-CA" b="1" dirty="0"/>
+              <a:t>Fetching Data</a:t>
+            </a:r>
+            <a:endParaRPr lang="en-CA" dirty="0"/>
           </a:p>
         </p:txBody>
       </p:sp>
     </p:spTree>
     <p:extLst>
       <p:ext uri="{BB962C8B-B14F-4D97-AF65-F5344CB8AC3E}">
-        <p14:creationId xmlns:p14="http://schemas.microsoft.com/office/powerpoint/2010/main" val="939329546"/>
+        <p14:creationId xmlns:p14="http://schemas.microsoft.com/office/powerpoint/2010/main" val="1397644104"/>
       </p:ext>
     </p:extLst>
   </p:cSld>
@@ -4267,7 +5002,7 @@
           <p:cNvPr id="2" name="Title 1">
             <a:extLst>
               <a:ext uri="{FF2B5EF4-FFF2-40B4-BE49-F238E27FC236}">
-                <a16:creationId xmlns:a16="http://schemas.microsoft.com/office/drawing/2014/main" id="{B0223B49-A8F9-9C38-2146-F342BD258D68}"/>
+                <a16:creationId xmlns:a16="http://schemas.microsoft.com/office/drawing/2014/main" id="{A7C322B3-1CE3-1E1B-90DB-A3F8D34D397E}"/>
               </a:ext>
             </a:extLst>
           </p:cNvPr>
@@ -4285,7 +5020,7 @@
           <a:p>
             <a:r>
               <a:rPr lang="en-US" dirty="0"/>
-              <a:t>Attribute-driven data</a:t>
+              <a:t>Using fetch with async/await</a:t>
             </a:r>
           </a:p>
         </p:txBody>
@@ -4295,7 +5030,7 @@
           <p:cNvPr id="3" name="Content Placeholder 2">
             <a:extLst>
               <a:ext uri="{FF2B5EF4-FFF2-40B4-BE49-F238E27FC236}">
-                <a16:creationId xmlns:a16="http://schemas.microsoft.com/office/drawing/2014/main" id="{14A32C82-E7BD-14D4-6BE0-E8D72E4F4393}"/>
+                <a16:creationId xmlns:a16="http://schemas.microsoft.com/office/drawing/2014/main" id="{0C73557C-A9AB-DCBE-122B-7D3F4D1463EA}"/>
               </a:ext>
             </a:extLst>
           </p:cNvPr>
@@ -4308,73 +5043,92 @@
         </p:nvSpPr>
         <p:spPr/>
         <p:txBody>
-          <a:bodyPr/>
+          <a:bodyPr>
+            <a:normAutofit/>
+          </a:bodyPr>
           <a:lstStyle/>
           <a:p>
             <a:pPr marL="0" indent="0">
               <a:buNone/>
             </a:pPr>
             <a:r>
-              <a:rPr lang="en-US" sz="2400" dirty="0">
+              <a:rPr lang="en-CA" dirty="0">
                 <a:latin typeface="Consolas" panose="020B0609020204030204" pitchFamily="49" charset="0"/>
                 <a:cs typeface="Consolas" panose="020B0609020204030204" pitchFamily="49" charset="0"/>
               </a:rPr>
-              <a:t>&lt;component attribute="http://</a:t>
-            </a:r>
-            <a:r>
-              <a:rPr lang="en-US" sz="2400" dirty="0" err="1">
+              <a:t>const response = await fetch(</a:t>
+            </a:r>
+            <a:r>
+              <a:rPr lang="en-CA" dirty="0" err="1">
                 <a:latin typeface="Consolas" panose="020B0609020204030204" pitchFamily="49" charset="0"/>
                 <a:cs typeface="Consolas" panose="020B0609020204030204" pitchFamily="49" charset="0"/>
               </a:rPr>
               <a:t>url</a:t>
             </a:r>
             <a:r>
-              <a:rPr lang="en-US" sz="2400" dirty="0">
+              <a:rPr lang="en-CA" dirty="0">
                 <a:latin typeface="Consolas" panose="020B0609020204030204" pitchFamily="49" charset="0"/>
                 <a:cs typeface="Consolas" panose="020B0609020204030204" pitchFamily="49" charset="0"/>
               </a:rPr>
-              <a:t>-to-some/data"&gt;&lt;/component&gt;</a:t>
+              <a:t>);</a:t>
             </a:r>
           </a:p>
           <a:p>
             <a:pPr marL="0" indent="0">
               <a:buNone/>
             </a:pPr>
-            <a:endParaRPr lang="en-US" dirty="0"/>
-          </a:p>
-          <a:p>
-            <a:r>
-              <a:rPr lang="en-CA" dirty="0"/>
-              <a:t>Attribute defines </a:t>
-            </a:r>
-            <a:r>
-              <a:rPr lang="en-CA" i="1" dirty="0"/>
-              <a:t>where data comes from</a:t>
-            </a:r>
-          </a:p>
-          <a:p>
-            <a:r>
-              <a:rPr lang="en-CA" dirty="0"/>
-              <a:t>Component decides </a:t>
-            </a:r>
-            <a:r>
-              <a:rPr lang="en-CA" i="1" dirty="0"/>
-              <a:t>how to fetch and render</a:t>
-            </a:r>
-            <a:endParaRPr lang="en-CA" dirty="0"/>
+            <a:r>
+              <a:rPr lang="en-CA" dirty="0">
+                <a:latin typeface="Consolas" panose="020B0609020204030204" pitchFamily="49" charset="0"/>
+                <a:cs typeface="Consolas" panose="020B0609020204030204" pitchFamily="49" charset="0"/>
+              </a:rPr>
+              <a:t>const data = await </a:t>
+            </a:r>
+            <a:r>
+              <a:rPr lang="en-CA" dirty="0" err="1">
+                <a:latin typeface="Consolas" panose="020B0609020204030204" pitchFamily="49" charset="0"/>
+                <a:cs typeface="Consolas" panose="020B0609020204030204" pitchFamily="49" charset="0"/>
+              </a:rPr>
+              <a:t>response.json</a:t>
+            </a:r>
+            <a:r>
+              <a:rPr lang="en-CA" dirty="0">
+                <a:latin typeface="Consolas" panose="020B0609020204030204" pitchFamily="49" charset="0"/>
+                <a:cs typeface="Consolas" panose="020B0609020204030204" pitchFamily="49" charset="0"/>
+              </a:rPr>
+              <a:t>();</a:t>
+            </a:r>
           </a:p>
           <a:p>
             <a:pPr marL="0" indent="0">
               <a:buNone/>
             </a:pPr>
-            <a:endParaRPr lang="en-US" dirty="0"/>
+            <a:endParaRPr lang="en-CA" dirty="0"/>
+          </a:p>
+          <a:p>
+            <a:r>
+              <a:rPr lang="en-CA" dirty="0"/>
+              <a:t>Await pauses this function</a:t>
+            </a:r>
+          </a:p>
+          <a:p>
+            <a:r>
+              <a:rPr lang="en-CA" dirty="0"/>
+              <a:t>The app keeps running</a:t>
+            </a:r>
+          </a:p>
+          <a:p>
+            <a:r>
+              <a:rPr lang="en-CA" dirty="0"/>
+              <a:t>Data arrives later</a:t>
+            </a:r>
           </a:p>
         </p:txBody>
       </p:sp>
     </p:spTree>
     <p:extLst>
       <p:ext uri="{BB962C8B-B14F-4D97-AF65-F5344CB8AC3E}">
-        <p14:creationId xmlns:p14="http://schemas.microsoft.com/office/powerpoint/2010/main" val="1757786802"/>
+        <p14:creationId xmlns:p14="http://schemas.microsoft.com/office/powerpoint/2010/main" val="615880361"/>
       </p:ext>
     </p:extLst>
   </p:cSld>
@@ -4533,6 +5287,784 @@
         <p:cNvPr id="1" name="">
           <a:extLst>
             <a:ext uri="{FF2B5EF4-FFF2-40B4-BE49-F238E27FC236}">
+              <a16:creationId xmlns:a16="http://schemas.microsoft.com/office/drawing/2014/main" id="{15F969E2-2604-57B7-BA36-ABE43CCA9F18}"/>
+            </a:ext>
+          </a:extLst>
+        </p:cNvPr>
+        <p:cNvGrpSpPr/>
+        <p:nvPr/>
+      </p:nvGrpSpPr>
+      <p:grpSpPr>
+        <a:xfrm>
+          <a:off x="0" y="0"/>
+          <a:ext cx="0" cy="0"/>
+          <a:chOff x="0" y="0"/>
+          <a:chExt cx="0" cy="0"/>
+        </a:xfrm>
+      </p:grpSpPr>
+      <p:sp>
+        <p:nvSpPr>
+          <p:cNvPr id="2" name="Title 1">
+            <a:extLst>
+              <a:ext uri="{FF2B5EF4-FFF2-40B4-BE49-F238E27FC236}">
+                <a16:creationId xmlns:a16="http://schemas.microsoft.com/office/drawing/2014/main" id="{2DDBCA8E-683C-3712-D44B-33515BC6ED88}"/>
+              </a:ext>
+            </a:extLst>
+          </p:cNvPr>
+          <p:cNvSpPr>
+            <a:spLocks noGrp="1"/>
+          </p:cNvSpPr>
+          <p:nvPr>
+            <p:ph type="title"/>
+          </p:nvPr>
+        </p:nvSpPr>
+        <p:spPr>
+          <a:xfrm>
+            <a:off x="838200" y="2766218"/>
+            <a:ext cx="10515600" cy="1325563"/>
+          </a:xfrm>
+        </p:spPr>
+        <p:txBody>
+          <a:bodyPr/>
+          <a:lstStyle/>
+          <a:p>
+            <a:pPr algn="ctr"/>
+            <a:r>
+              <a:rPr lang="en-CA" b="1" dirty="0"/>
+              <a:t>Coordinating Data</a:t>
+            </a:r>
+            <a:endParaRPr lang="en-CA" dirty="0"/>
+          </a:p>
+        </p:txBody>
+      </p:sp>
+    </p:spTree>
+    <p:extLst>
+      <p:ext uri="{BB962C8B-B14F-4D97-AF65-F5344CB8AC3E}">
+        <p14:creationId xmlns:p14="http://schemas.microsoft.com/office/powerpoint/2010/main" val="2568515927"/>
+      </p:ext>
+    </p:extLst>
+  </p:cSld>
+  <p:clrMapOvr>
+    <a:masterClrMapping/>
+  </p:clrMapOvr>
+  <p:transition spd="med">
+    <p:pull/>
+  </p:transition>
+</p:sld>
+</file>
+
+<file path=ppt/slides/slide21.xml><?xml version="1.0" encoding="utf-8"?>
+<p:sld xmlns:a="http://schemas.openxmlformats.org/drawingml/2006/main" xmlns:r="http://schemas.openxmlformats.org/officeDocument/2006/relationships" xmlns:p="http://schemas.openxmlformats.org/presentationml/2006/main">
+  <p:cSld>
+    <p:spTree>
+      <p:nvGrpSpPr>
+        <p:cNvPr id="1" name=""/>
+        <p:cNvGrpSpPr/>
+        <p:nvPr/>
+      </p:nvGrpSpPr>
+      <p:grpSpPr>
+        <a:xfrm>
+          <a:off x="0" y="0"/>
+          <a:ext cx="0" cy="0"/>
+          <a:chOff x="0" y="0"/>
+          <a:chExt cx="0" cy="0"/>
+        </a:xfrm>
+      </p:grpSpPr>
+      <p:sp>
+        <p:nvSpPr>
+          <p:cNvPr id="2" name="Title 1">
+            <a:extLst>
+              <a:ext uri="{FF2B5EF4-FFF2-40B4-BE49-F238E27FC236}">
+                <a16:creationId xmlns:a16="http://schemas.microsoft.com/office/drawing/2014/main" id="{EB3F1CE5-C4AC-4AAD-1BE2-61F7590DDC6B}"/>
+              </a:ext>
+            </a:extLst>
+          </p:cNvPr>
+          <p:cNvSpPr>
+            <a:spLocks noGrp="1"/>
+          </p:cNvSpPr>
+          <p:nvPr>
+            <p:ph type="title"/>
+          </p:nvPr>
+        </p:nvSpPr>
+        <p:spPr/>
+        <p:txBody>
+          <a:bodyPr/>
+          <a:lstStyle/>
+          <a:p>
+            <a:r>
+              <a:rPr lang="en-US" dirty="0"/>
+              <a:t>App shell as coordinator</a:t>
+            </a:r>
+          </a:p>
+        </p:txBody>
+      </p:sp>
+      <p:sp>
+        <p:nvSpPr>
+          <p:cNvPr id="3" name="Content Placeholder 2">
+            <a:extLst>
+              <a:ext uri="{FF2B5EF4-FFF2-40B4-BE49-F238E27FC236}">
+                <a16:creationId xmlns:a16="http://schemas.microsoft.com/office/drawing/2014/main" id="{659E5B33-C6D8-B4FA-51B9-2D89C29F4E49}"/>
+              </a:ext>
+            </a:extLst>
+          </p:cNvPr>
+          <p:cNvSpPr>
+            <a:spLocks noGrp="1"/>
+          </p:cNvSpPr>
+          <p:nvPr>
+            <p:ph idx="1"/>
+          </p:nvPr>
+        </p:nvSpPr>
+        <p:spPr/>
+        <p:txBody>
+          <a:bodyPr>
+            <a:normAutofit/>
+          </a:bodyPr>
+          <a:lstStyle/>
+          <a:p>
+            <a:r>
+              <a:rPr lang="en-US" dirty="0"/>
+              <a:t>Owns the fetch</a:t>
+            </a:r>
+          </a:p>
+          <a:p>
+            <a:r>
+              <a:rPr lang="en-US" dirty="0"/>
+              <a:t>Handles success and failure</a:t>
+            </a:r>
+          </a:p>
+          <a:p>
+            <a:r>
+              <a:rPr lang="en-US" dirty="0"/>
+              <a:t>Pushes data into components</a:t>
+            </a:r>
+          </a:p>
+          <a:p>
+            <a:pPr marL="0" indent="0">
+              <a:buNone/>
+            </a:pPr>
+            <a:endParaRPr lang="en-US" dirty="0"/>
+          </a:p>
+          <a:p>
+            <a:pPr marL="0" indent="0">
+              <a:buNone/>
+            </a:pPr>
+            <a:r>
+              <a:rPr lang="en-US" dirty="0"/>
+              <a:t>Components stay focused on rendering.</a:t>
+            </a:r>
+          </a:p>
+        </p:txBody>
+      </p:sp>
+    </p:spTree>
+    <p:extLst>
+      <p:ext uri="{BB962C8B-B14F-4D97-AF65-F5344CB8AC3E}">
+        <p14:creationId xmlns:p14="http://schemas.microsoft.com/office/powerpoint/2010/main" val="1122787579"/>
+      </p:ext>
+    </p:extLst>
+  </p:cSld>
+  <p:clrMapOvr>
+    <a:masterClrMapping/>
+  </p:clrMapOvr>
+</p:sld>
+</file>
+
+<file path=ppt/slides/slide22.xml><?xml version="1.0" encoding="utf-8"?>
+<p:sld xmlns:a="http://schemas.openxmlformats.org/drawingml/2006/main" xmlns:r="http://schemas.openxmlformats.org/officeDocument/2006/relationships" xmlns:p="http://schemas.openxmlformats.org/presentationml/2006/main">
+  <p:cSld>
+    <p:spTree>
+      <p:nvGrpSpPr>
+        <p:cNvPr id="1" name="">
+          <a:extLst>
+            <a:ext uri="{FF2B5EF4-FFF2-40B4-BE49-F238E27FC236}">
+              <a16:creationId xmlns:a16="http://schemas.microsoft.com/office/drawing/2014/main" id="{F69E3A23-E8EF-8998-4BCB-7D3D2FD453F0}"/>
+            </a:ext>
+          </a:extLst>
+        </p:cNvPr>
+        <p:cNvGrpSpPr/>
+        <p:nvPr/>
+      </p:nvGrpSpPr>
+      <p:grpSpPr>
+        <a:xfrm>
+          <a:off x="0" y="0"/>
+          <a:ext cx="0" cy="0"/>
+          <a:chOff x="0" y="0"/>
+          <a:chExt cx="0" cy="0"/>
+        </a:xfrm>
+      </p:grpSpPr>
+      <p:sp>
+        <p:nvSpPr>
+          <p:cNvPr id="2" name="Title 1">
+            <a:extLst>
+              <a:ext uri="{FF2B5EF4-FFF2-40B4-BE49-F238E27FC236}">
+                <a16:creationId xmlns:a16="http://schemas.microsoft.com/office/drawing/2014/main" id="{B129089A-B2A5-EF23-AFB8-AE7917F530B9}"/>
+              </a:ext>
+            </a:extLst>
+          </p:cNvPr>
+          <p:cNvSpPr>
+            <a:spLocks noGrp="1"/>
+          </p:cNvSpPr>
+          <p:nvPr>
+            <p:ph type="title"/>
+          </p:nvPr>
+        </p:nvSpPr>
+        <p:spPr>
+          <a:xfrm>
+            <a:off x="838200" y="2766218"/>
+            <a:ext cx="10515600" cy="1325563"/>
+          </a:xfrm>
+        </p:spPr>
+        <p:txBody>
+          <a:bodyPr/>
+          <a:lstStyle/>
+          <a:p>
+            <a:pPr algn="ctr"/>
+            <a:r>
+              <a:rPr lang="en-CA" dirty="0"/>
+              <a:t>Async States</a:t>
+            </a:r>
+          </a:p>
+        </p:txBody>
+      </p:sp>
+    </p:spTree>
+    <p:extLst>
+      <p:ext uri="{BB962C8B-B14F-4D97-AF65-F5344CB8AC3E}">
+        <p14:creationId xmlns:p14="http://schemas.microsoft.com/office/powerpoint/2010/main" val="1986178434"/>
+      </p:ext>
+    </p:extLst>
+  </p:cSld>
+  <p:clrMapOvr>
+    <a:masterClrMapping/>
+  </p:clrMapOvr>
+  <p:transition spd="med">
+    <p:pull/>
+  </p:transition>
+</p:sld>
+</file>
+
+<file path=ppt/slides/slide23.xml><?xml version="1.0" encoding="utf-8"?>
+<p:sld xmlns:a="http://schemas.openxmlformats.org/drawingml/2006/main" xmlns:r="http://schemas.openxmlformats.org/officeDocument/2006/relationships" xmlns:p="http://schemas.openxmlformats.org/presentationml/2006/main">
+  <p:cSld>
+    <p:spTree>
+      <p:nvGrpSpPr>
+        <p:cNvPr id="1" name="">
+          <a:extLst>
+            <a:ext uri="{FF2B5EF4-FFF2-40B4-BE49-F238E27FC236}">
+              <a16:creationId xmlns:a16="http://schemas.microsoft.com/office/drawing/2014/main" id="{2DC9E877-0EA3-695E-C85E-0732EE5FFD4B}"/>
+            </a:ext>
+          </a:extLst>
+        </p:cNvPr>
+        <p:cNvGrpSpPr/>
+        <p:nvPr/>
+      </p:nvGrpSpPr>
+      <p:grpSpPr>
+        <a:xfrm>
+          <a:off x="0" y="0"/>
+          <a:ext cx="0" cy="0"/>
+          <a:chOff x="0" y="0"/>
+          <a:chExt cx="0" cy="0"/>
+        </a:xfrm>
+      </p:grpSpPr>
+      <p:sp>
+        <p:nvSpPr>
+          <p:cNvPr id="2" name="Title 1">
+            <a:extLst>
+              <a:ext uri="{FF2B5EF4-FFF2-40B4-BE49-F238E27FC236}">
+                <a16:creationId xmlns:a16="http://schemas.microsoft.com/office/drawing/2014/main" id="{9D47AC32-BC89-CE84-1701-B2335D5D710C}"/>
+              </a:ext>
+            </a:extLst>
+          </p:cNvPr>
+          <p:cNvSpPr>
+            <a:spLocks noGrp="1"/>
+          </p:cNvSpPr>
+          <p:nvPr>
+            <p:ph type="title"/>
+          </p:nvPr>
+        </p:nvSpPr>
+        <p:spPr/>
+        <p:txBody>
+          <a:bodyPr/>
+          <a:lstStyle/>
+          <a:p>
+            <a:r>
+              <a:rPr lang="en-US" dirty="0"/>
+              <a:t>What we're not solving yet</a:t>
+            </a:r>
+          </a:p>
+        </p:txBody>
+      </p:sp>
+      <p:sp>
+        <p:nvSpPr>
+          <p:cNvPr id="3" name="Content Placeholder 2">
+            <a:extLst>
+              <a:ext uri="{FF2B5EF4-FFF2-40B4-BE49-F238E27FC236}">
+                <a16:creationId xmlns:a16="http://schemas.microsoft.com/office/drawing/2014/main" id="{88C2BF19-AB39-BE49-8C7C-3A29B186222A}"/>
+              </a:ext>
+            </a:extLst>
+          </p:cNvPr>
+          <p:cNvSpPr>
+            <a:spLocks noGrp="1"/>
+          </p:cNvSpPr>
+          <p:nvPr>
+            <p:ph idx="1"/>
+          </p:nvPr>
+        </p:nvSpPr>
+        <p:spPr/>
+        <p:txBody>
+          <a:bodyPr>
+            <a:normAutofit/>
+          </a:bodyPr>
+          <a:lstStyle/>
+          <a:p>
+            <a:r>
+              <a:rPr lang="en-US" dirty="0"/>
+              <a:t>Loading indicators</a:t>
+            </a:r>
+          </a:p>
+          <a:p>
+            <a:r>
+              <a:rPr lang="en-US" dirty="0"/>
+              <a:t>Error messages</a:t>
+            </a:r>
+          </a:p>
+          <a:p>
+            <a:r>
+              <a:rPr lang="en-US" dirty="0"/>
+              <a:t>Retry logic</a:t>
+            </a:r>
+          </a:p>
+          <a:p>
+            <a:endParaRPr lang="en-US" dirty="0"/>
+          </a:p>
+          <a:p>
+            <a:pPr marL="0" indent="0">
+              <a:buNone/>
+            </a:pPr>
+            <a:r>
+              <a:rPr lang="en-US" dirty="0"/>
+              <a:t>We note these now and add them later.</a:t>
+            </a:r>
+          </a:p>
+        </p:txBody>
+      </p:sp>
+    </p:spTree>
+    <p:extLst>
+      <p:ext uri="{BB962C8B-B14F-4D97-AF65-F5344CB8AC3E}">
+        <p14:creationId xmlns:p14="http://schemas.microsoft.com/office/powerpoint/2010/main" val="1466043018"/>
+      </p:ext>
+    </p:extLst>
+  </p:cSld>
+  <p:clrMapOvr>
+    <a:masterClrMapping/>
+  </p:clrMapOvr>
+</p:sld>
+</file>
+
+<file path=ppt/slides/slide24.xml><?xml version="1.0" encoding="utf-8"?>
+<p:sld xmlns:a="http://schemas.openxmlformats.org/drawingml/2006/main" xmlns:r="http://schemas.openxmlformats.org/officeDocument/2006/relationships" xmlns:p="http://schemas.openxmlformats.org/presentationml/2006/main">
+  <p:cSld>
+    <p:spTree>
+      <p:nvGrpSpPr>
+        <p:cNvPr id="1" name="">
+          <a:extLst>
+            <a:ext uri="{FF2B5EF4-FFF2-40B4-BE49-F238E27FC236}">
+              <a16:creationId xmlns:a16="http://schemas.microsoft.com/office/drawing/2014/main" id="{361FB298-8217-C169-8161-DF413241C4E3}"/>
+            </a:ext>
+          </a:extLst>
+        </p:cNvPr>
+        <p:cNvGrpSpPr/>
+        <p:nvPr/>
+      </p:nvGrpSpPr>
+      <p:grpSpPr>
+        <a:xfrm>
+          <a:off x="0" y="0"/>
+          <a:ext cx="0" cy="0"/>
+          <a:chOff x="0" y="0"/>
+          <a:chExt cx="0" cy="0"/>
+        </a:xfrm>
+      </p:grpSpPr>
+      <p:sp>
+        <p:nvSpPr>
+          <p:cNvPr id="2" name="Title 1">
+            <a:extLst>
+              <a:ext uri="{FF2B5EF4-FFF2-40B4-BE49-F238E27FC236}">
+                <a16:creationId xmlns:a16="http://schemas.microsoft.com/office/drawing/2014/main" id="{830E9014-C30C-F16A-8EF8-01B4CC4F2866}"/>
+              </a:ext>
+            </a:extLst>
+          </p:cNvPr>
+          <p:cNvSpPr>
+            <a:spLocks noGrp="1"/>
+          </p:cNvSpPr>
+          <p:nvPr>
+            <p:ph type="title"/>
+          </p:nvPr>
+        </p:nvSpPr>
+        <p:spPr>
+          <a:xfrm>
+            <a:off x="838200" y="2766218"/>
+            <a:ext cx="10515600" cy="1325563"/>
+          </a:xfrm>
+        </p:spPr>
+        <p:txBody>
+          <a:bodyPr/>
+          <a:lstStyle/>
+          <a:p>
+            <a:pPr algn="ctr"/>
+            <a:r>
+              <a:rPr lang="en-CA" dirty="0"/>
+              <a:t>Stage 2: Component Fetching</a:t>
+            </a:r>
+          </a:p>
+        </p:txBody>
+      </p:sp>
+    </p:spTree>
+    <p:extLst>
+      <p:ext uri="{BB962C8B-B14F-4D97-AF65-F5344CB8AC3E}">
+        <p14:creationId xmlns:p14="http://schemas.microsoft.com/office/powerpoint/2010/main" val="3583935102"/>
+      </p:ext>
+    </p:extLst>
+  </p:cSld>
+  <p:clrMapOvr>
+    <a:masterClrMapping/>
+  </p:clrMapOvr>
+  <p:transition spd="med">
+    <p:pull/>
+  </p:transition>
+</p:sld>
+</file>
+
+<file path=ppt/slides/slide25.xml><?xml version="1.0" encoding="utf-8"?>
+<p:sld xmlns:a="http://schemas.openxmlformats.org/drawingml/2006/main" xmlns:r="http://schemas.openxmlformats.org/officeDocument/2006/relationships" xmlns:p="http://schemas.openxmlformats.org/presentationml/2006/main">
+  <p:cSld>
+    <p:spTree>
+      <p:nvGrpSpPr>
+        <p:cNvPr id="1" name="">
+          <a:extLst>
+            <a:ext uri="{FF2B5EF4-FFF2-40B4-BE49-F238E27FC236}">
+              <a16:creationId xmlns:a16="http://schemas.microsoft.com/office/drawing/2014/main" id="{554920B6-0F1F-328B-252A-75A46C4CA554}"/>
+            </a:ext>
+          </a:extLst>
+        </p:cNvPr>
+        <p:cNvGrpSpPr/>
+        <p:nvPr/>
+      </p:nvGrpSpPr>
+      <p:grpSpPr>
+        <a:xfrm>
+          <a:off x="0" y="0"/>
+          <a:ext cx="0" cy="0"/>
+          <a:chOff x="0" y="0"/>
+          <a:chExt cx="0" cy="0"/>
+        </a:xfrm>
+      </p:grpSpPr>
+      <p:sp>
+        <p:nvSpPr>
+          <p:cNvPr id="2" name="Title 1">
+            <a:extLst>
+              <a:ext uri="{FF2B5EF4-FFF2-40B4-BE49-F238E27FC236}">
+                <a16:creationId xmlns:a16="http://schemas.microsoft.com/office/drawing/2014/main" id="{6EE51C8C-D6C9-F221-FD85-10999210892C}"/>
+              </a:ext>
+            </a:extLst>
+          </p:cNvPr>
+          <p:cNvSpPr>
+            <a:spLocks noGrp="1"/>
+          </p:cNvSpPr>
+          <p:nvPr>
+            <p:ph type="title"/>
+          </p:nvPr>
+        </p:nvSpPr>
+        <p:spPr/>
+        <p:txBody>
+          <a:bodyPr/>
+          <a:lstStyle/>
+          <a:p>
+            <a:r>
+              <a:rPr lang="en-US" dirty="0"/>
+              <a:t>Making components reusable</a:t>
+            </a:r>
+          </a:p>
+        </p:txBody>
+      </p:sp>
+      <p:sp>
+        <p:nvSpPr>
+          <p:cNvPr id="3" name="Content Placeholder 2">
+            <a:extLst>
+              <a:ext uri="{FF2B5EF4-FFF2-40B4-BE49-F238E27FC236}">
+                <a16:creationId xmlns:a16="http://schemas.microsoft.com/office/drawing/2014/main" id="{73BFC555-A632-BF7A-8E14-013948112165}"/>
+              </a:ext>
+            </a:extLst>
+          </p:cNvPr>
+          <p:cNvSpPr>
+            <a:spLocks noGrp="1"/>
+          </p:cNvSpPr>
+          <p:nvPr>
+            <p:ph idx="1"/>
+          </p:nvPr>
+        </p:nvSpPr>
+        <p:spPr/>
+        <p:txBody>
+          <a:bodyPr>
+            <a:normAutofit/>
+          </a:bodyPr>
+          <a:lstStyle/>
+          <a:p>
+            <a:pPr marL="0" indent="0">
+              <a:buNone/>
+            </a:pPr>
+            <a:r>
+              <a:rPr lang="en-US" dirty="0"/>
+              <a:t>Instead of fetching in the app shell (e.g., </a:t>
+            </a:r>
+            <a:r>
+              <a:rPr lang="en-US" dirty="0" err="1"/>
+              <a:t>index.js</a:t>
+            </a:r>
+            <a:r>
+              <a:rPr lang="en-US" dirty="0"/>
+              <a:t> or </a:t>
+            </a:r>
+            <a:r>
+              <a:rPr lang="en-US" dirty="0" err="1"/>
+              <a:t>main.js</a:t>
+            </a:r>
+            <a:r>
+              <a:rPr lang="en-US" dirty="0"/>
+              <a:t>), we let the component load its own data.</a:t>
+            </a:r>
+          </a:p>
+        </p:txBody>
+      </p:sp>
+    </p:spTree>
+    <p:extLst>
+      <p:ext uri="{BB962C8B-B14F-4D97-AF65-F5344CB8AC3E}">
+        <p14:creationId xmlns:p14="http://schemas.microsoft.com/office/powerpoint/2010/main" val="4095847557"/>
+      </p:ext>
+    </p:extLst>
+  </p:cSld>
+  <p:clrMapOvr>
+    <a:masterClrMapping/>
+  </p:clrMapOvr>
+</p:sld>
+</file>
+
+<file path=ppt/slides/slide26.xml><?xml version="1.0" encoding="utf-8"?>
+<p:sld xmlns:a="http://schemas.openxmlformats.org/drawingml/2006/main" xmlns:r="http://schemas.openxmlformats.org/officeDocument/2006/relationships" xmlns:p="http://schemas.openxmlformats.org/presentationml/2006/main">
+  <p:cSld>
+    <p:spTree>
+      <p:nvGrpSpPr>
+        <p:cNvPr id="1" name="">
+          <a:extLst>
+            <a:ext uri="{FF2B5EF4-FFF2-40B4-BE49-F238E27FC236}">
+              <a16:creationId xmlns:a16="http://schemas.microsoft.com/office/drawing/2014/main" id="{BE1504D3-F223-9EF4-EA4B-2E47191947AC}"/>
+            </a:ext>
+          </a:extLst>
+        </p:cNvPr>
+        <p:cNvGrpSpPr/>
+        <p:nvPr/>
+      </p:nvGrpSpPr>
+      <p:grpSpPr>
+        <a:xfrm>
+          <a:off x="0" y="0"/>
+          <a:ext cx="0" cy="0"/>
+          <a:chOff x="0" y="0"/>
+          <a:chExt cx="0" cy="0"/>
+        </a:xfrm>
+      </p:grpSpPr>
+      <p:sp>
+        <p:nvSpPr>
+          <p:cNvPr id="2" name="Title 1">
+            <a:extLst>
+              <a:ext uri="{FF2B5EF4-FFF2-40B4-BE49-F238E27FC236}">
+                <a16:creationId xmlns:a16="http://schemas.microsoft.com/office/drawing/2014/main" id="{E0FE4681-FBA1-4ED3-F886-DE9C12BA0C86}"/>
+              </a:ext>
+            </a:extLst>
+          </p:cNvPr>
+          <p:cNvSpPr>
+            <a:spLocks noGrp="1"/>
+          </p:cNvSpPr>
+          <p:nvPr>
+            <p:ph type="title"/>
+          </p:nvPr>
+        </p:nvSpPr>
+        <p:spPr>
+          <a:xfrm>
+            <a:off x="838200" y="2766218"/>
+            <a:ext cx="10515600" cy="1325563"/>
+          </a:xfrm>
+        </p:spPr>
+        <p:txBody>
+          <a:bodyPr/>
+          <a:lstStyle/>
+          <a:p>
+            <a:pPr algn="ctr"/>
+            <a:r>
+              <a:rPr lang="en-CA" dirty="0"/>
+              <a:t>Passing the endpoint</a:t>
+            </a:r>
+          </a:p>
+        </p:txBody>
+      </p:sp>
+    </p:spTree>
+    <p:extLst>
+      <p:ext uri="{BB962C8B-B14F-4D97-AF65-F5344CB8AC3E}">
+        <p14:creationId xmlns:p14="http://schemas.microsoft.com/office/powerpoint/2010/main" val="939329546"/>
+      </p:ext>
+    </p:extLst>
+  </p:cSld>
+  <p:clrMapOvr>
+    <a:masterClrMapping/>
+  </p:clrMapOvr>
+  <p:transition spd="med">
+    <p:pull/>
+  </p:transition>
+</p:sld>
+</file>
+
+<file path=ppt/slides/slide27.xml><?xml version="1.0" encoding="utf-8"?>
+<p:sld xmlns:a="http://schemas.openxmlformats.org/drawingml/2006/main" xmlns:r="http://schemas.openxmlformats.org/officeDocument/2006/relationships" xmlns:p="http://schemas.openxmlformats.org/presentationml/2006/main">
+  <p:cSld>
+    <p:spTree>
+      <p:nvGrpSpPr>
+        <p:cNvPr id="1" name=""/>
+        <p:cNvGrpSpPr/>
+        <p:nvPr/>
+      </p:nvGrpSpPr>
+      <p:grpSpPr>
+        <a:xfrm>
+          <a:off x="0" y="0"/>
+          <a:ext cx="0" cy="0"/>
+          <a:chOff x="0" y="0"/>
+          <a:chExt cx="0" cy="0"/>
+        </a:xfrm>
+      </p:grpSpPr>
+      <p:sp>
+        <p:nvSpPr>
+          <p:cNvPr id="2" name="Title 1">
+            <a:extLst>
+              <a:ext uri="{FF2B5EF4-FFF2-40B4-BE49-F238E27FC236}">
+                <a16:creationId xmlns:a16="http://schemas.microsoft.com/office/drawing/2014/main" id="{B0223B49-A8F9-9C38-2146-F342BD258D68}"/>
+              </a:ext>
+            </a:extLst>
+          </p:cNvPr>
+          <p:cNvSpPr>
+            <a:spLocks noGrp="1"/>
+          </p:cNvSpPr>
+          <p:nvPr>
+            <p:ph type="title"/>
+          </p:nvPr>
+        </p:nvSpPr>
+        <p:spPr/>
+        <p:txBody>
+          <a:bodyPr/>
+          <a:lstStyle/>
+          <a:p>
+            <a:r>
+              <a:rPr lang="en-US" dirty="0"/>
+              <a:t>Attribute-driven data</a:t>
+            </a:r>
+          </a:p>
+        </p:txBody>
+      </p:sp>
+      <p:sp>
+        <p:nvSpPr>
+          <p:cNvPr id="3" name="Content Placeholder 2">
+            <a:extLst>
+              <a:ext uri="{FF2B5EF4-FFF2-40B4-BE49-F238E27FC236}">
+                <a16:creationId xmlns:a16="http://schemas.microsoft.com/office/drawing/2014/main" id="{14A32C82-E7BD-14D4-6BE0-E8D72E4F4393}"/>
+              </a:ext>
+            </a:extLst>
+          </p:cNvPr>
+          <p:cNvSpPr>
+            <a:spLocks noGrp="1"/>
+          </p:cNvSpPr>
+          <p:nvPr>
+            <p:ph idx="1"/>
+          </p:nvPr>
+        </p:nvSpPr>
+        <p:spPr/>
+        <p:txBody>
+          <a:bodyPr/>
+          <a:lstStyle/>
+          <a:p>
+            <a:pPr marL="0" indent="0">
+              <a:buNone/>
+            </a:pPr>
+            <a:r>
+              <a:rPr lang="en-US" sz="2400" dirty="0">
+                <a:latin typeface="Consolas" panose="020B0609020204030204" pitchFamily="49" charset="0"/>
+                <a:cs typeface="Consolas" panose="020B0609020204030204" pitchFamily="49" charset="0"/>
+              </a:rPr>
+              <a:t>&lt;component attribute="http://</a:t>
+            </a:r>
+            <a:r>
+              <a:rPr lang="en-US" sz="2400" dirty="0" err="1">
+                <a:latin typeface="Consolas" panose="020B0609020204030204" pitchFamily="49" charset="0"/>
+                <a:cs typeface="Consolas" panose="020B0609020204030204" pitchFamily="49" charset="0"/>
+              </a:rPr>
+              <a:t>url</a:t>
+            </a:r>
+            <a:r>
+              <a:rPr lang="en-US" sz="2400" dirty="0">
+                <a:latin typeface="Consolas" panose="020B0609020204030204" pitchFamily="49" charset="0"/>
+                <a:cs typeface="Consolas" panose="020B0609020204030204" pitchFamily="49" charset="0"/>
+              </a:rPr>
+              <a:t>-to-some/data"&gt;&lt;/component&gt;</a:t>
+            </a:r>
+          </a:p>
+          <a:p>
+            <a:pPr marL="0" indent="0">
+              <a:buNone/>
+            </a:pPr>
+            <a:endParaRPr lang="en-US" dirty="0"/>
+          </a:p>
+          <a:p>
+            <a:r>
+              <a:rPr lang="en-CA" dirty="0"/>
+              <a:t>Attribute defines </a:t>
+            </a:r>
+            <a:r>
+              <a:rPr lang="en-CA" i="1" dirty="0"/>
+              <a:t>where data comes from</a:t>
+            </a:r>
+          </a:p>
+          <a:p>
+            <a:r>
+              <a:rPr lang="en-CA" dirty="0"/>
+              <a:t>Component decides </a:t>
+            </a:r>
+            <a:r>
+              <a:rPr lang="en-CA" i="1" dirty="0"/>
+              <a:t>how to fetch and render</a:t>
+            </a:r>
+            <a:endParaRPr lang="en-CA" dirty="0"/>
+          </a:p>
+          <a:p>
+            <a:pPr marL="0" indent="0">
+              <a:buNone/>
+            </a:pPr>
+            <a:endParaRPr lang="en-US" dirty="0"/>
+          </a:p>
+        </p:txBody>
+      </p:sp>
+    </p:spTree>
+    <p:extLst>
+      <p:ext uri="{BB962C8B-B14F-4D97-AF65-F5344CB8AC3E}">
+        <p14:creationId xmlns:p14="http://schemas.microsoft.com/office/powerpoint/2010/main" val="1757786802"/>
+      </p:ext>
+    </p:extLst>
+  </p:cSld>
+  <p:clrMapOvr>
+    <a:masterClrMapping/>
+  </p:clrMapOvr>
+</p:sld>
+</file>
+
+<file path=ppt/slides/slide28.xml><?xml version="1.0" encoding="utf-8"?>
+<p:sld xmlns:a="http://schemas.openxmlformats.org/drawingml/2006/main" xmlns:r="http://schemas.openxmlformats.org/officeDocument/2006/relationships" xmlns:p="http://schemas.openxmlformats.org/presentationml/2006/main">
+  <p:cSld>
+    <p:spTree>
+      <p:nvGrpSpPr>
+        <p:cNvPr id="1" name="">
+          <a:extLst>
+            <a:ext uri="{FF2B5EF4-FFF2-40B4-BE49-F238E27FC236}">
               <a16:creationId xmlns:a16="http://schemas.microsoft.com/office/drawing/2014/main" id="{64C5F10A-3413-5955-1DFF-FF78E5EA79D6}"/>
             </a:ext>
           </a:extLst>
@@ -4598,7 +6130,7 @@
 </p:sld>
 </file>
 
-<file path=ppt/slides/slide21.xml><?xml version="1.0" encoding="utf-8"?>
+<file path=ppt/slides/slide29.xml><?xml version="1.0" encoding="utf-8"?>
 <p:sld xmlns:a="http://schemas.openxmlformats.org/drawingml/2006/main" xmlns:r="http://schemas.openxmlformats.org/officeDocument/2006/relationships" xmlns:p="http://schemas.openxmlformats.org/presentationml/2006/main">
   <p:cSld>
     <p:spTree>
@@ -4722,7 +6254,128 @@
 </p:sld>
 </file>
 
-<file path=ppt/slides/slide22.xml><?xml version="1.0" encoding="utf-8"?>
+<file path=ppt/slides/slide3.xml><?xml version="1.0" encoding="utf-8"?>
+<p:sld xmlns:a="http://schemas.openxmlformats.org/drawingml/2006/main" xmlns:r="http://schemas.openxmlformats.org/officeDocument/2006/relationships" xmlns:p="http://schemas.openxmlformats.org/presentationml/2006/main">
+  <p:cSld>
+    <p:spTree>
+      <p:nvGrpSpPr>
+        <p:cNvPr id="1" name=""/>
+        <p:cNvGrpSpPr/>
+        <p:nvPr/>
+      </p:nvGrpSpPr>
+      <p:grpSpPr>
+        <a:xfrm>
+          <a:off x="0" y="0"/>
+          <a:ext cx="0" cy="0"/>
+          <a:chOff x="0" y="0"/>
+          <a:chExt cx="0" cy="0"/>
+        </a:xfrm>
+      </p:grpSpPr>
+      <p:sp>
+        <p:nvSpPr>
+          <p:cNvPr id="2" name="Title 1">
+            <a:extLst>
+              <a:ext uri="{FF2B5EF4-FFF2-40B4-BE49-F238E27FC236}">
+                <a16:creationId xmlns:a16="http://schemas.microsoft.com/office/drawing/2014/main" id="{0866C05A-AE25-1768-8A9B-9E1C61225334}"/>
+              </a:ext>
+            </a:extLst>
+          </p:cNvPr>
+          <p:cNvSpPr>
+            <a:spLocks noGrp="1"/>
+          </p:cNvSpPr>
+          <p:nvPr>
+            <p:ph type="title"/>
+          </p:nvPr>
+        </p:nvSpPr>
+        <p:spPr/>
+        <p:txBody>
+          <a:bodyPr/>
+          <a:lstStyle/>
+          <a:p>
+            <a:r>
+              <a:rPr lang="en-US" dirty="0"/>
+              <a:t>Agenda</a:t>
+            </a:r>
+          </a:p>
+        </p:txBody>
+      </p:sp>
+      <p:sp>
+        <p:nvSpPr>
+          <p:cNvPr id="3" name="Content Placeholder 2">
+            <a:extLst>
+              <a:ext uri="{FF2B5EF4-FFF2-40B4-BE49-F238E27FC236}">
+                <a16:creationId xmlns:a16="http://schemas.microsoft.com/office/drawing/2014/main" id="{915481B4-3432-EE69-114F-1E97A4260877}"/>
+              </a:ext>
+            </a:extLst>
+          </p:cNvPr>
+          <p:cNvSpPr>
+            <a:spLocks noGrp="1"/>
+          </p:cNvSpPr>
+          <p:nvPr>
+            <p:ph idx="1"/>
+          </p:nvPr>
+        </p:nvSpPr>
+        <p:spPr/>
+        <p:txBody>
+          <a:bodyPr/>
+          <a:lstStyle/>
+          <a:p>
+            <a:r>
+              <a:rPr lang="en-US" dirty="0"/>
+              <a:t>Review synchronous vs asynchronous execution</a:t>
+            </a:r>
+          </a:p>
+          <a:p>
+            <a:r>
+              <a:rPr lang="en-US" dirty="0"/>
+              <a:t>Review </a:t>
+            </a:r>
+            <a:r>
+              <a:rPr lang="en-US" dirty="0">
+                <a:latin typeface="Consolas" panose="020B0609020204030204" pitchFamily="49" charset="0"/>
+                <a:cs typeface="Consolas" panose="020B0609020204030204" pitchFamily="49" charset="0"/>
+              </a:rPr>
+              <a:t>fetch</a:t>
+            </a:r>
+            <a:r>
+              <a:rPr lang="en-US" dirty="0"/>
+              <a:t> and async data loading</a:t>
+            </a:r>
+          </a:p>
+          <a:p>
+            <a:r>
+              <a:rPr lang="en-US" dirty="0"/>
+              <a:t>Instructor demo</a:t>
+            </a:r>
+          </a:p>
+          <a:p>
+            <a:r>
+              <a:rPr lang="en-US" dirty="0"/>
+              <a:t>Refactor: component-driven fetching</a:t>
+            </a:r>
+          </a:p>
+          <a:p>
+            <a:r>
+              <a:rPr lang="en-US" dirty="0"/>
+              <a:t>Practice and reflection</a:t>
+            </a:r>
+          </a:p>
+        </p:txBody>
+      </p:sp>
+    </p:spTree>
+    <p:extLst>
+      <p:ext uri="{BB962C8B-B14F-4D97-AF65-F5344CB8AC3E}">
+        <p14:creationId xmlns:p14="http://schemas.microsoft.com/office/powerpoint/2010/main" val="1231324705"/>
+      </p:ext>
+    </p:extLst>
+  </p:cSld>
+  <p:clrMapOvr>
+    <a:masterClrMapping/>
+  </p:clrMapOvr>
+</p:sld>
+</file>
+
+<file path=ppt/slides/slide30.xml><?xml version="1.0" encoding="utf-8"?>
 <p:sld xmlns:a="http://schemas.openxmlformats.org/drawingml/2006/main" xmlns:r="http://schemas.openxmlformats.org/officeDocument/2006/relationships" xmlns:p="http://schemas.openxmlformats.org/presentationml/2006/main">
   <p:cSld>
     <p:spTree>
@@ -4815,7 +6468,7 @@
 </p:sld>
 </file>
 
-<file path=ppt/slides/slide23.xml><?xml version="1.0" encoding="utf-8"?>
+<file path=ppt/slides/slide31.xml><?xml version="1.0" encoding="utf-8"?>
 <p:sld xmlns:a="http://schemas.openxmlformats.org/drawingml/2006/main" xmlns:r="http://schemas.openxmlformats.org/officeDocument/2006/relationships" xmlns:p="http://schemas.openxmlformats.org/presentationml/2006/main">
   <p:cSld>
     <p:spTree>
@@ -4888,7 +6541,7 @@
 </p:sld>
 </file>
 
-<file path=ppt/slides/slide24.xml><?xml version="1.0" encoding="utf-8"?>
+<file path=ppt/slides/slide32.xml><?xml version="1.0" encoding="utf-8"?>
 <p:sld xmlns:a="http://schemas.openxmlformats.org/drawingml/2006/main" xmlns:r="http://schemas.openxmlformats.org/officeDocument/2006/relationships" xmlns:p="http://schemas.openxmlformats.org/presentationml/2006/main">
   <p:cSld>
     <p:spTree>
@@ -5303,7 +6956,7 @@
 </p:sld>
 </file>
 
-<file path=ppt/slides/slide25.xml><?xml version="1.0" encoding="utf-8"?>
+<file path=ppt/slides/slide33.xml><?xml version="1.0" encoding="utf-8"?>
 <p:sld xmlns:a="http://schemas.openxmlformats.org/drawingml/2006/main" xmlns:r="http://schemas.openxmlformats.org/officeDocument/2006/relationships" xmlns:p="http://schemas.openxmlformats.org/presentationml/2006/main">
   <p:cSld>
     <p:spTree>
@@ -5376,7 +7029,7 @@
 </p:sld>
 </file>
 
-<file path=ppt/slides/slide26.xml><?xml version="1.0" encoding="utf-8"?>
+<file path=ppt/slides/slide34.xml><?xml version="1.0" encoding="utf-8"?>
 <p:sld xmlns:a="http://schemas.openxmlformats.org/drawingml/2006/main" xmlns:r="http://schemas.openxmlformats.org/officeDocument/2006/relationships" xmlns:p="http://schemas.openxmlformats.org/presentationml/2006/main">
   <p:cSld>
     <p:spTree>
@@ -5497,7 +7150,7 @@
 </p:sld>
 </file>
 
-<file path=ppt/slides/slide27.xml><?xml version="1.0" encoding="utf-8"?>
+<file path=ppt/slides/slide35.xml><?xml version="1.0" encoding="utf-8"?>
 <p:sld xmlns:a="http://schemas.openxmlformats.org/drawingml/2006/main" xmlns:r="http://schemas.openxmlformats.org/officeDocument/2006/relationships" xmlns:p="http://schemas.openxmlformats.org/presentationml/2006/main">
   <p:cSld>
     <p:spTree>
@@ -5673,7 +7326,7 @@
 </p:sld>
 </file>
 
-<file path=ppt/slides/slide28.xml><?xml version="1.0" encoding="utf-8"?>
+<file path=ppt/slides/slide36.xml><?xml version="1.0" encoding="utf-8"?>
 <p:sld xmlns:a="http://schemas.openxmlformats.org/drawingml/2006/main" xmlns:r="http://schemas.openxmlformats.org/officeDocument/2006/relationships" xmlns:p="http://schemas.openxmlformats.org/presentationml/2006/main">
   <p:cSld>
     <p:spTree>
@@ -5816,7 +7469,7 @@
 </p:sld>
 </file>
 
-<file path=ppt/slides/slide29.xml><?xml version="1.0" encoding="utf-8"?>
+<file path=ppt/slides/slide37.xml><?xml version="1.0" encoding="utf-8"?>
 <p:sld xmlns:a="http://schemas.openxmlformats.org/drawingml/2006/main" xmlns:r="http://schemas.openxmlformats.org/officeDocument/2006/relationships" xmlns:p="http://schemas.openxmlformats.org/presentationml/2006/main">
   <p:cSld>
     <p:spTree>
@@ -5909,127 +7562,6 @@
   <p:transition spd="med">
     <p:pull/>
   </p:transition>
-</p:sld>
-</file>
-
-<file path=ppt/slides/slide3.xml><?xml version="1.0" encoding="utf-8"?>
-<p:sld xmlns:a="http://schemas.openxmlformats.org/drawingml/2006/main" xmlns:r="http://schemas.openxmlformats.org/officeDocument/2006/relationships" xmlns:p="http://schemas.openxmlformats.org/presentationml/2006/main">
-  <p:cSld>
-    <p:spTree>
-      <p:nvGrpSpPr>
-        <p:cNvPr id="1" name=""/>
-        <p:cNvGrpSpPr/>
-        <p:nvPr/>
-      </p:nvGrpSpPr>
-      <p:grpSpPr>
-        <a:xfrm>
-          <a:off x="0" y="0"/>
-          <a:ext cx="0" cy="0"/>
-          <a:chOff x="0" y="0"/>
-          <a:chExt cx="0" cy="0"/>
-        </a:xfrm>
-      </p:grpSpPr>
-      <p:sp>
-        <p:nvSpPr>
-          <p:cNvPr id="2" name="Title 1">
-            <a:extLst>
-              <a:ext uri="{FF2B5EF4-FFF2-40B4-BE49-F238E27FC236}">
-                <a16:creationId xmlns:a16="http://schemas.microsoft.com/office/drawing/2014/main" id="{0866C05A-AE25-1768-8A9B-9E1C61225334}"/>
-              </a:ext>
-            </a:extLst>
-          </p:cNvPr>
-          <p:cNvSpPr>
-            <a:spLocks noGrp="1"/>
-          </p:cNvSpPr>
-          <p:nvPr>
-            <p:ph type="title"/>
-          </p:nvPr>
-        </p:nvSpPr>
-        <p:spPr/>
-        <p:txBody>
-          <a:bodyPr/>
-          <a:lstStyle/>
-          <a:p>
-            <a:r>
-              <a:rPr lang="en-US" dirty="0"/>
-              <a:t>Agenda</a:t>
-            </a:r>
-          </a:p>
-        </p:txBody>
-      </p:sp>
-      <p:sp>
-        <p:nvSpPr>
-          <p:cNvPr id="3" name="Content Placeholder 2">
-            <a:extLst>
-              <a:ext uri="{FF2B5EF4-FFF2-40B4-BE49-F238E27FC236}">
-                <a16:creationId xmlns:a16="http://schemas.microsoft.com/office/drawing/2014/main" id="{915481B4-3432-EE69-114F-1E97A4260877}"/>
-              </a:ext>
-            </a:extLst>
-          </p:cNvPr>
-          <p:cNvSpPr>
-            <a:spLocks noGrp="1"/>
-          </p:cNvSpPr>
-          <p:nvPr>
-            <p:ph idx="1"/>
-          </p:nvPr>
-        </p:nvSpPr>
-        <p:spPr/>
-        <p:txBody>
-          <a:bodyPr/>
-          <a:lstStyle/>
-          <a:p>
-            <a:r>
-              <a:rPr lang="en-US" dirty="0"/>
-              <a:t>Review synchronous vs asynchronous execution</a:t>
-            </a:r>
-          </a:p>
-          <a:p>
-            <a:r>
-              <a:rPr lang="en-US" dirty="0"/>
-              <a:t>Review </a:t>
-            </a:r>
-            <a:r>
-              <a:rPr lang="en-US" dirty="0">
-                <a:latin typeface="Consolas" panose="020B0609020204030204" pitchFamily="49" charset="0"/>
-                <a:cs typeface="Consolas" panose="020B0609020204030204" pitchFamily="49" charset="0"/>
-              </a:rPr>
-              <a:t>fetch</a:t>
-            </a:r>
-            <a:r>
-              <a:rPr lang="en-US" dirty="0"/>
-              <a:t> and async data loading</a:t>
-            </a:r>
-          </a:p>
-          <a:p>
-            <a:r>
-              <a:rPr lang="en-US" dirty="0"/>
-              <a:t>Instructor demo</a:t>
-            </a:r>
-          </a:p>
-          <a:p>
-            <a:r>
-              <a:rPr lang="en-US" dirty="0"/>
-              <a:t>Refactor: component-driven fetching</a:t>
-            </a:r>
-          </a:p>
-          <a:p>
-            <a:r>
-              <a:rPr lang="en-US" dirty="0"/>
-              <a:t>Practice and reflection</a:t>
-            </a:r>
-          </a:p>
-        </p:txBody>
-      </p:sp>
-    </p:spTree>
-    <p:extLst>
-      <p:ext uri="{BB962C8B-B14F-4D97-AF65-F5344CB8AC3E}">
-        <p14:creationId xmlns:p14="http://schemas.microsoft.com/office/powerpoint/2010/main" val="1231324705"/>
-      </p:ext>
-    </p:extLst>
-  </p:cSld>
-  <p:clrMapOvr>
-    <a:masterClrMapping/>
-  </p:clrMapOvr>
 </p:sld>
 </file>
 
@@ -6085,7 +7617,7 @@
             <a:pPr algn="ctr"/>
             <a:r>
               <a:rPr lang="en-CA" dirty="0"/>
-              <a:t>Why async matters</a:t>
+              <a:t>Connecting</a:t>
             </a:r>
           </a:p>
         </p:txBody>
@@ -6152,7 +7684,7 @@
           <a:p>
             <a:r>
               <a:rPr lang="en-CA" dirty="0"/>
-              <a:t>Building on Lesson 02</a:t>
+              <a:t>Why async matters</a:t>
             </a:r>
             <a:endParaRPr lang="en-CA" b="0" dirty="0"/>
           </a:p>
@@ -6431,7 +7963,7 @@
         <p:cNvPr id="1" name="">
           <a:extLst>
             <a:ext uri="{FF2B5EF4-FFF2-40B4-BE49-F238E27FC236}">
-              <a16:creationId xmlns:a16="http://schemas.microsoft.com/office/drawing/2014/main" id="{853921E6-990F-3418-1CCF-0F1C7C0C63B1}"/>
+              <a16:creationId xmlns:a16="http://schemas.microsoft.com/office/drawing/2014/main" id="{5D5E8DDC-5CAF-8C2E-AC71-BD16391A4B82}"/>
             </a:ext>
           </a:extLst>
         </p:cNvPr>
@@ -6451,7 +7983,7 @@
           <p:cNvPr id="2" name="Title 1">
             <a:extLst>
               <a:ext uri="{FF2B5EF4-FFF2-40B4-BE49-F238E27FC236}">
-                <a16:creationId xmlns:a16="http://schemas.microsoft.com/office/drawing/2014/main" id="{BFEF335C-98F7-A233-B3F9-B129C39A633D}"/>
+                <a16:creationId xmlns:a16="http://schemas.microsoft.com/office/drawing/2014/main" id="{143FF2E8-4E54-ED2C-0752-EE01D1D6811E}"/>
               </a:ext>
             </a:extLst>
           </p:cNvPr>
@@ -6474,17 +8006,16 @@
           <a:p>
             <a:pPr algn="ctr"/>
             <a:r>
-              <a:rPr lang="en-CA" b="1" dirty="0"/>
-              <a:t>Stage 1: Fetch COORDINATION</a:t>
-            </a:r>
-            <a:endParaRPr lang="en-CA" dirty="0"/>
+              <a:rPr lang="en-CA" dirty="0"/>
+              <a:t>Promises</a:t>
+            </a:r>
           </a:p>
         </p:txBody>
       </p:sp>
     </p:spTree>
     <p:extLst>
       <p:ext uri="{BB962C8B-B14F-4D97-AF65-F5344CB8AC3E}">
-        <p14:creationId xmlns:p14="http://schemas.microsoft.com/office/powerpoint/2010/main" val="2371156263"/>
+        <p14:creationId xmlns:p14="http://schemas.microsoft.com/office/powerpoint/2010/main" val="1484660151"/>
       </p:ext>
     </p:extLst>
   </p:cSld>
@@ -6502,7 +8033,13 @@
   <p:cSld>
     <p:spTree>
       <p:nvGrpSpPr>
-        <p:cNvPr id="1" name=""/>
+        <p:cNvPr id="1" name="">
+          <a:extLst>
+            <a:ext uri="{FF2B5EF4-FFF2-40B4-BE49-F238E27FC236}">
+              <a16:creationId xmlns:a16="http://schemas.microsoft.com/office/drawing/2014/main" id="{A5839576-5427-0ADA-10F4-865ACD2F3499}"/>
+            </a:ext>
+          </a:extLst>
+        </p:cNvPr>
         <p:cNvGrpSpPr/>
         <p:nvPr/>
       </p:nvGrpSpPr>
@@ -6519,7 +8056,7 @@
           <p:cNvPr id="2" name="Title 1">
             <a:extLst>
               <a:ext uri="{FF2B5EF4-FFF2-40B4-BE49-F238E27FC236}">
-                <a16:creationId xmlns:a16="http://schemas.microsoft.com/office/drawing/2014/main" id="{10E899A8-F5D7-3FC8-C4E3-1C1B403ED37A}"/>
+                <a16:creationId xmlns:a16="http://schemas.microsoft.com/office/drawing/2014/main" id="{187E519A-A233-24D7-52BE-831AD2B54B2A}"/>
               </a:ext>
             </a:extLst>
           </p:cNvPr>
@@ -6537,7 +8074,7 @@
           <a:p>
             <a:r>
               <a:rPr lang="en-US" dirty="0"/>
-              <a:t>Starting simple</a:t>
+              <a:t>What a Promise represents</a:t>
             </a:r>
           </a:p>
         </p:txBody>
@@ -6547,7 +8084,7 @@
           <p:cNvPr id="3" name="Content Placeholder 2">
             <a:extLst>
               <a:ext uri="{FF2B5EF4-FFF2-40B4-BE49-F238E27FC236}">
-                <a16:creationId xmlns:a16="http://schemas.microsoft.com/office/drawing/2014/main" id="{EDD7D136-F0B8-16E7-3E2E-AA9D4908A883}"/>
+                <a16:creationId xmlns:a16="http://schemas.microsoft.com/office/drawing/2014/main" id="{EBB6DEC3-94B8-5AF7-B03D-628C50C5AE18}"/>
               </a:ext>
             </a:extLst>
           </p:cNvPr>
@@ -6563,59 +8100,61 @@
           <a:bodyPr/>
           <a:lstStyle/>
           <a:p>
-            <a:pPr marL="514350" indent="-514350">
-              <a:buFont typeface="+mj-lt"/>
-              <a:buAutoNum type="arabicPeriod"/>
+            <a:r>
+              <a:rPr lang="en-US" dirty="0"/>
+              <a:t>A value that will exist </a:t>
+            </a:r>
+            <a:r>
+              <a:rPr lang="en-US" b="1" dirty="0"/>
+              <a:t>later</a:t>
+            </a:r>
+            <a:endParaRPr lang="en-US" dirty="0"/>
+          </a:p>
+          <a:p>
+            <a:r>
+              <a:rPr lang="en-US" dirty="0"/>
+              <a:t>One of three states:</a:t>
+            </a:r>
+          </a:p>
+          <a:p>
+            <a:pPr lvl="1"/>
+            <a:r>
+              <a:rPr lang="en-US" dirty="0"/>
+              <a:t>pending</a:t>
+            </a:r>
+          </a:p>
+          <a:p>
+            <a:pPr lvl="1"/>
+            <a:r>
+              <a:rPr lang="en-US" dirty="0"/>
+              <a:t>fulfilled</a:t>
+            </a:r>
+          </a:p>
+          <a:p>
+            <a:pPr lvl="1"/>
+            <a:r>
+              <a:rPr lang="en-US" dirty="0"/>
+              <a:t>rejected</a:t>
+            </a:r>
+          </a:p>
+          <a:p>
+            <a:endParaRPr lang="en-US" dirty="0"/>
+          </a:p>
+          <a:p>
+            <a:pPr marL="0" indent="0">
+              <a:buNone/>
             </a:pPr>
             <a:r>
-              <a:rPr lang="en-CA" dirty="0"/>
-              <a:t>Application loads</a:t>
-            </a:r>
-          </a:p>
-          <a:p>
-            <a:pPr marL="514350" indent="-514350">
-              <a:buFont typeface="+mj-lt"/>
-              <a:buAutoNum type="arabicPeriod"/>
-            </a:pPr>
-            <a:r>
-              <a:rPr lang="en-CA" dirty="0"/>
-              <a:t>The app container/shell fetches resources</a:t>
-            </a:r>
-          </a:p>
-          <a:p>
-            <a:pPr marL="514350" indent="-514350">
-              <a:buFont typeface="+mj-lt"/>
-              <a:buAutoNum type="arabicPeriod"/>
-            </a:pPr>
-            <a:r>
-              <a:rPr lang="en-CA" dirty="0"/>
-              <a:t>Data is passed into components</a:t>
-            </a:r>
-          </a:p>
-          <a:p>
-            <a:pPr marL="514350" indent="-514350">
-              <a:buFont typeface="+mj-lt"/>
-              <a:buAutoNum type="arabicPeriod"/>
-            </a:pPr>
-            <a:endParaRPr lang="en-CA" dirty="0"/>
-          </a:p>
-          <a:p>
-            <a:pPr marL="514350" indent="-514350">
-              <a:buFont typeface="+mj-lt"/>
-              <a:buAutoNum type="arabicPeriod"/>
-            </a:pPr>
-            <a:r>
-              <a:rPr lang="en-CA" dirty="0"/>
-              <a:t>Everything is explicit and easy to trace.</a:t>
-            </a:r>
-            <a:endParaRPr lang="en-US" dirty="0"/>
+              <a:rPr lang="en-US" dirty="0"/>
+              <a:t>Promises model work that hasn’t finished yet.</a:t>
+            </a:r>
           </a:p>
         </p:txBody>
       </p:sp>
     </p:spTree>
     <p:extLst>
       <p:ext uri="{BB962C8B-B14F-4D97-AF65-F5344CB8AC3E}">
-        <p14:creationId xmlns:p14="http://schemas.microsoft.com/office/powerpoint/2010/main" val="3800437051"/>
+        <p14:creationId xmlns:p14="http://schemas.microsoft.com/office/powerpoint/2010/main" val="2446176914"/>
       </p:ext>
     </p:extLst>
   </p:cSld>

</xml_diff>